<commit_message>
updated slides and online content for section 5
</commit_message>
<xml_diff>
--- a/slides/5-Variables and Outputs.pptx
+++ b/slides/5-Variables and Outputs.pptx
@@ -7,11 +7,12 @@
   <p:sldIdLst>
     <p:sldId id="256" r:id="rId2"/>
     <p:sldId id="257" r:id="rId3"/>
-    <p:sldId id="258" r:id="rId4"/>
-    <p:sldId id="259" r:id="rId5"/>
-    <p:sldId id="260" r:id="rId6"/>
-    <p:sldId id="266" r:id="rId7"/>
-    <p:sldId id="267" r:id="rId8"/>
+    <p:sldId id="268" r:id="rId4"/>
+    <p:sldId id="258" r:id="rId5"/>
+    <p:sldId id="259" r:id="rId6"/>
+    <p:sldId id="260" r:id="rId7"/>
+    <p:sldId id="266" r:id="rId8"/>
+    <p:sldId id="267" r:id="rId9"/>
   </p:sldIdLst>
   <p:sldSz cx="12192000" cy="6858000"/>
   <p:notesSz cx="6858000" cy="9144000"/>
@@ -2876,6 +2877,925 @@
 </file>
 
 <file path=ppt/diagrams/colors4.xml><?xml version="1.0" encoding="utf-8"?>
+<dgm:colorsDef xmlns:dgm="http://schemas.openxmlformats.org/drawingml/2006/diagram" xmlns:a="http://schemas.openxmlformats.org/drawingml/2006/main" uniqueId="urn:microsoft.com/office/officeart/2005/8/colors/colorful1">
+  <dgm:title val=""/>
+  <dgm:desc val=""/>
+  <dgm:catLst>
+    <dgm:cat type="colorful" pri="10100"/>
+  </dgm:catLst>
+  <dgm:styleLbl name="node0">
+    <dgm:fillClrLst meth="repeat">
+      <a:schemeClr val="accent1"/>
+    </dgm:fillClrLst>
+    <dgm:linClrLst meth="repeat">
+      <a:schemeClr val="lt1"/>
+    </dgm:linClrLst>
+    <dgm:effectClrLst/>
+    <dgm:txLinClrLst/>
+    <dgm:txFillClrLst/>
+    <dgm:txEffectClrLst/>
+  </dgm:styleLbl>
+  <dgm:styleLbl name="node1">
+    <dgm:fillClrLst meth="repeat">
+      <a:schemeClr val="accent2"/>
+      <a:schemeClr val="accent3"/>
+      <a:schemeClr val="accent4"/>
+      <a:schemeClr val="accent5"/>
+      <a:schemeClr val="accent6"/>
+    </dgm:fillClrLst>
+    <dgm:linClrLst meth="repeat">
+      <a:schemeClr val="lt1"/>
+    </dgm:linClrLst>
+    <dgm:effectClrLst/>
+    <dgm:txLinClrLst/>
+    <dgm:txFillClrLst/>
+    <dgm:txEffectClrLst/>
+  </dgm:styleLbl>
+  <dgm:styleLbl name="alignNode1">
+    <dgm:fillClrLst meth="repeat">
+      <a:schemeClr val="accent2"/>
+      <a:schemeClr val="accent3"/>
+      <a:schemeClr val="accent4"/>
+      <a:schemeClr val="accent5"/>
+      <a:schemeClr val="accent6"/>
+    </dgm:fillClrLst>
+    <dgm:linClrLst meth="repeat">
+      <a:schemeClr val="accent2"/>
+      <a:schemeClr val="accent3"/>
+      <a:schemeClr val="accent4"/>
+      <a:schemeClr val="accent5"/>
+      <a:schemeClr val="accent6"/>
+    </dgm:linClrLst>
+    <dgm:effectClrLst/>
+    <dgm:txLinClrLst/>
+    <dgm:txFillClrLst/>
+    <dgm:txEffectClrLst/>
+  </dgm:styleLbl>
+  <dgm:styleLbl name="lnNode1">
+    <dgm:fillClrLst meth="repeat">
+      <a:schemeClr val="accent2"/>
+      <a:schemeClr val="accent3"/>
+      <a:schemeClr val="accent4"/>
+      <a:schemeClr val="accent5"/>
+      <a:schemeClr val="accent6"/>
+    </dgm:fillClrLst>
+    <dgm:linClrLst meth="repeat">
+      <a:schemeClr val="lt1"/>
+    </dgm:linClrLst>
+    <dgm:effectClrLst/>
+    <dgm:txLinClrLst/>
+    <dgm:txFillClrLst/>
+    <dgm:txEffectClrLst/>
+  </dgm:styleLbl>
+  <dgm:styleLbl name="vennNode1">
+    <dgm:fillClrLst meth="repeat">
+      <a:schemeClr val="accent2">
+        <a:alpha val="50000"/>
+      </a:schemeClr>
+      <a:schemeClr val="accent3">
+        <a:alpha val="50000"/>
+      </a:schemeClr>
+      <a:schemeClr val="accent4">
+        <a:alpha val="50000"/>
+      </a:schemeClr>
+      <a:schemeClr val="accent5">
+        <a:alpha val="50000"/>
+      </a:schemeClr>
+      <a:schemeClr val="accent6">
+        <a:alpha val="50000"/>
+      </a:schemeClr>
+    </dgm:fillClrLst>
+    <dgm:linClrLst meth="repeat">
+      <a:schemeClr val="lt1"/>
+    </dgm:linClrLst>
+    <dgm:effectClrLst/>
+    <dgm:txLinClrLst/>
+    <dgm:txFillClrLst/>
+    <dgm:txEffectClrLst/>
+  </dgm:styleLbl>
+  <dgm:styleLbl name="node2">
+    <dgm:fillClrLst>
+      <a:schemeClr val="accent2"/>
+    </dgm:fillClrLst>
+    <dgm:linClrLst meth="repeat">
+      <a:schemeClr val="lt1"/>
+    </dgm:linClrLst>
+    <dgm:effectClrLst/>
+    <dgm:txLinClrLst/>
+    <dgm:txFillClrLst/>
+    <dgm:txEffectClrLst/>
+  </dgm:styleLbl>
+  <dgm:styleLbl name="node3">
+    <dgm:fillClrLst>
+      <a:schemeClr val="accent3"/>
+    </dgm:fillClrLst>
+    <dgm:linClrLst meth="repeat">
+      <a:schemeClr val="lt1"/>
+    </dgm:linClrLst>
+    <dgm:effectClrLst/>
+    <dgm:txLinClrLst/>
+    <dgm:txFillClrLst/>
+    <dgm:txEffectClrLst/>
+  </dgm:styleLbl>
+  <dgm:styleLbl name="node4">
+    <dgm:fillClrLst>
+      <a:schemeClr val="accent4"/>
+    </dgm:fillClrLst>
+    <dgm:linClrLst meth="repeat">
+      <a:schemeClr val="lt1"/>
+    </dgm:linClrLst>
+    <dgm:effectClrLst/>
+    <dgm:txLinClrLst/>
+    <dgm:txFillClrLst/>
+    <dgm:txEffectClrLst/>
+  </dgm:styleLbl>
+  <dgm:styleLbl name="fgImgPlace1">
+    <dgm:fillClrLst meth="repeat">
+      <a:schemeClr val="accent2">
+        <a:tint val="50000"/>
+      </a:schemeClr>
+      <a:schemeClr val="accent3">
+        <a:tint val="50000"/>
+      </a:schemeClr>
+      <a:schemeClr val="accent4">
+        <a:tint val="50000"/>
+      </a:schemeClr>
+      <a:schemeClr val="accent5">
+        <a:tint val="50000"/>
+      </a:schemeClr>
+      <a:schemeClr val="accent6">
+        <a:tint val="50000"/>
+      </a:schemeClr>
+    </dgm:fillClrLst>
+    <dgm:linClrLst meth="repeat">
+      <a:schemeClr val="lt1"/>
+    </dgm:linClrLst>
+    <dgm:effectClrLst/>
+    <dgm:txLinClrLst/>
+    <dgm:txFillClrLst meth="repeat">
+      <a:schemeClr val="lt1"/>
+    </dgm:txFillClrLst>
+    <dgm:txEffectClrLst/>
+  </dgm:styleLbl>
+  <dgm:styleLbl name="alignImgPlace1">
+    <dgm:fillClrLst>
+      <a:schemeClr val="accent1">
+        <a:tint val="50000"/>
+      </a:schemeClr>
+      <a:schemeClr val="accent2">
+        <a:tint val="20000"/>
+      </a:schemeClr>
+    </dgm:fillClrLst>
+    <dgm:linClrLst meth="repeat">
+      <a:schemeClr val="lt1"/>
+    </dgm:linClrLst>
+    <dgm:effectClrLst/>
+    <dgm:txLinClrLst/>
+    <dgm:txFillClrLst meth="repeat">
+      <a:schemeClr val="lt1"/>
+    </dgm:txFillClrLst>
+    <dgm:txEffectClrLst/>
+  </dgm:styleLbl>
+  <dgm:styleLbl name="bgImgPlace1">
+    <dgm:fillClrLst>
+      <a:schemeClr val="accent1">
+        <a:tint val="50000"/>
+      </a:schemeClr>
+      <a:schemeClr val="accent2">
+        <a:tint val="20000"/>
+      </a:schemeClr>
+    </dgm:fillClrLst>
+    <dgm:linClrLst meth="repeat">
+      <a:schemeClr val="lt1"/>
+    </dgm:linClrLst>
+    <dgm:effectClrLst/>
+    <dgm:txLinClrLst/>
+    <dgm:txFillClrLst meth="repeat">
+      <a:schemeClr val="lt1"/>
+    </dgm:txFillClrLst>
+    <dgm:txEffectClrLst/>
+  </dgm:styleLbl>
+  <dgm:styleLbl name="sibTrans2D1">
+    <dgm:fillClrLst meth="repeat">
+      <a:schemeClr val="accent2"/>
+      <a:schemeClr val="accent3"/>
+      <a:schemeClr val="accent4"/>
+      <a:schemeClr val="accent5"/>
+      <a:schemeClr val="accent6"/>
+    </dgm:fillClrLst>
+    <dgm:linClrLst meth="cycle">
+      <a:schemeClr val="lt1"/>
+    </dgm:linClrLst>
+    <dgm:effectClrLst/>
+    <dgm:txLinClrLst/>
+    <dgm:txFillClrLst/>
+    <dgm:txEffectClrLst/>
+  </dgm:styleLbl>
+  <dgm:styleLbl name="fgSibTrans2D1">
+    <dgm:fillClrLst meth="repeat">
+      <a:schemeClr val="accent2"/>
+      <a:schemeClr val="accent3"/>
+      <a:schemeClr val="accent4"/>
+      <a:schemeClr val="accent5"/>
+      <a:schemeClr val="accent6"/>
+    </dgm:fillClrLst>
+    <dgm:linClrLst meth="cycle">
+      <a:schemeClr val="lt1"/>
+    </dgm:linClrLst>
+    <dgm:effectClrLst/>
+    <dgm:txLinClrLst/>
+    <dgm:txFillClrLst meth="repeat">
+      <a:schemeClr val="lt1"/>
+    </dgm:txFillClrLst>
+    <dgm:txEffectClrLst/>
+  </dgm:styleLbl>
+  <dgm:styleLbl name="bgSibTrans2D1">
+    <dgm:fillClrLst meth="repeat">
+      <a:schemeClr val="accent2"/>
+      <a:schemeClr val="accent3"/>
+      <a:schemeClr val="accent4"/>
+      <a:schemeClr val="accent5"/>
+      <a:schemeClr val="accent6"/>
+    </dgm:fillClrLst>
+    <dgm:linClrLst meth="cycle">
+      <a:schemeClr val="lt1"/>
+    </dgm:linClrLst>
+    <dgm:effectClrLst/>
+    <dgm:txLinClrLst/>
+    <dgm:txFillClrLst meth="repeat">
+      <a:schemeClr val="lt1"/>
+    </dgm:txFillClrLst>
+    <dgm:txEffectClrLst/>
+  </dgm:styleLbl>
+  <dgm:styleLbl name="sibTrans1D1">
+    <dgm:fillClrLst meth="repeat">
+      <a:schemeClr val="accent2"/>
+      <a:schemeClr val="accent3"/>
+      <a:schemeClr val="accent4"/>
+      <a:schemeClr val="accent5"/>
+      <a:schemeClr val="accent6"/>
+    </dgm:fillClrLst>
+    <dgm:linClrLst meth="repeat">
+      <a:schemeClr val="accent2"/>
+      <a:schemeClr val="accent3"/>
+      <a:schemeClr val="accent4"/>
+      <a:schemeClr val="accent5"/>
+      <a:schemeClr val="accent6"/>
+    </dgm:linClrLst>
+    <dgm:effectClrLst/>
+    <dgm:txLinClrLst/>
+    <dgm:txFillClrLst meth="repeat">
+      <a:schemeClr val="tx1"/>
+    </dgm:txFillClrLst>
+    <dgm:txEffectClrLst/>
+  </dgm:styleLbl>
+  <dgm:styleLbl name="callout">
+    <dgm:fillClrLst meth="repeat">
+      <a:schemeClr val="accent2"/>
+    </dgm:fillClrLst>
+    <dgm:linClrLst meth="repeat">
+      <a:schemeClr val="accent2">
+        <a:tint val="50000"/>
+      </a:schemeClr>
+    </dgm:linClrLst>
+    <dgm:effectClrLst/>
+    <dgm:txLinClrLst/>
+    <dgm:txFillClrLst meth="repeat">
+      <a:schemeClr val="tx1"/>
+    </dgm:txFillClrLst>
+    <dgm:txEffectClrLst/>
+  </dgm:styleLbl>
+  <dgm:styleLbl name="asst0">
+    <dgm:fillClrLst meth="repeat">
+      <a:schemeClr val="accent1"/>
+    </dgm:fillClrLst>
+    <dgm:linClrLst meth="repeat">
+      <a:schemeClr val="lt1"/>
+    </dgm:linClrLst>
+    <dgm:effectClrLst/>
+    <dgm:txLinClrLst/>
+    <dgm:txFillClrLst/>
+    <dgm:txEffectClrLst/>
+  </dgm:styleLbl>
+  <dgm:styleLbl name="asst1">
+    <dgm:fillClrLst meth="repeat">
+      <a:schemeClr val="accent2"/>
+    </dgm:fillClrLst>
+    <dgm:linClrLst meth="repeat">
+      <a:schemeClr val="lt1"/>
+    </dgm:linClrLst>
+    <dgm:effectClrLst/>
+    <dgm:txLinClrLst/>
+    <dgm:txFillClrLst/>
+    <dgm:txEffectClrLst/>
+  </dgm:styleLbl>
+  <dgm:styleLbl name="asst2">
+    <dgm:fillClrLst>
+      <a:schemeClr val="accent3"/>
+    </dgm:fillClrLst>
+    <dgm:linClrLst meth="repeat">
+      <a:schemeClr val="lt1"/>
+    </dgm:linClrLst>
+    <dgm:effectClrLst/>
+    <dgm:txLinClrLst/>
+    <dgm:txFillClrLst/>
+    <dgm:txEffectClrLst/>
+  </dgm:styleLbl>
+  <dgm:styleLbl name="asst3">
+    <dgm:fillClrLst>
+      <a:schemeClr val="accent4"/>
+    </dgm:fillClrLst>
+    <dgm:linClrLst meth="repeat">
+      <a:schemeClr val="lt1"/>
+    </dgm:linClrLst>
+    <dgm:effectClrLst/>
+    <dgm:txLinClrLst/>
+    <dgm:txFillClrLst/>
+    <dgm:txEffectClrLst/>
+  </dgm:styleLbl>
+  <dgm:styleLbl name="asst4">
+    <dgm:fillClrLst>
+      <a:schemeClr val="accent5"/>
+    </dgm:fillClrLst>
+    <dgm:linClrLst meth="repeat">
+      <a:schemeClr val="lt1"/>
+    </dgm:linClrLst>
+    <dgm:effectClrLst/>
+    <dgm:txLinClrLst/>
+    <dgm:txFillClrLst/>
+    <dgm:txEffectClrLst/>
+  </dgm:styleLbl>
+  <dgm:styleLbl name="parChTrans2D1">
+    <dgm:fillClrLst meth="repeat">
+      <a:schemeClr val="accent2"/>
+    </dgm:fillClrLst>
+    <dgm:linClrLst meth="repeat">
+      <a:schemeClr val="lt1"/>
+    </dgm:linClrLst>
+    <dgm:effectClrLst/>
+    <dgm:txLinClrLst/>
+    <dgm:txFillClrLst meth="repeat">
+      <a:schemeClr val="lt1"/>
+    </dgm:txFillClrLst>
+    <dgm:txEffectClrLst/>
+  </dgm:styleLbl>
+  <dgm:styleLbl name="parChTrans2D2">
+    <dgm:fillClrLst meth="repeat">
+      <a:schemeClr val="accent3"/>
+    </dgm:fillClrLst>
+    <dgm:linClrLst meth="repeat">
+      <a:schemeClr val="lt1"/>
+    </dgm:linClrLst>
+    <dgm:effectClrLst/>
+    <dgm:txLinClrLst/>
+    <dgm:txFillClrLst/>
+    <dgm:txEffectClrLst/>
+  </dgm:styleLbl>
+  <dgm:styleLbl name="parChTrans2D3">
+    <dgm:fillClrLst meth="repeat">
+      <a:schemeClr val="accent4"/>
+    </dgm:fillClrLst>
+    <dgm:linClrLst meth="repeat">
+      <a:schemeClr val="lt1"/>
+    </dgm:linClrLst>
+    <dgm:effectClrLst/>
+    <dgm:txLinClrLst/>
+    <dgm:txFillClrLst/>
+    <dgm:txEffectClrLst/>
+  </dgm:styleLbl>
+  <dgm:styleLbl name="parChTrans2D4">
+    <dgm:fillClrLst meth="repeat">
+      <a:schemeClr val="accent5"/>
+    </dgm:fillClrLst>
+    <dgm:linClrLst meth="repeat">
+      <a:schemeClr val="lt1"/>
+    </dgm:linClrLst>
+    <dgm:effectClrLst/>
+    <dgm:txLinClrLst/>
+    <dgm:txFillClrLst meth="repeat">
+      <a:schemeClr val="lt1"/>
+    </dgm:txFillClrLst>
+    <dgm:txEffectClrLst/>
+  </dgm:styleLbl>
+  <dgm:styleLbl name="parChTrans1D1">
+    <dgm:fillClrLst meth="repeat">
+      <a:schemeClr val="accent2"/>
+    </dgm:fillClrLst>
+    <dgm:linClrLst meth="repeat">
+      <a:schemeClr val="accent1"/>
+    </dgm:linClrLst>
+    <dgm:effectClrLst/>
+    <dgm:txLinClrLst/>
+    <dgm:txFillClrLst meth="repeat">
+      <a:schemeClr val="tx1"/>
+    </dgm:txFillClrLst>
+    <dgm:txEffectClrLst/>
+  </dgm:styleLbl>
+  <dgm:styleLbl name="parChTrans1D2">
+    <dgm:fillClrLst meth="repeat">
+      <a:schemeClr val="accent3">
+        <a:tint val="90000"/>
+      </a:schemeClr>
+    </dgm:fillClrLst>
+    <dgm:linClrLst meth="repeat">
+      <a:schemeClr val="accent2"/>
+    </dgm:linClrLst>
+    <dgm:effectClrLst/>
+    <dgm:txLinClrLst/>
+    <dgm:txFillClrLst meth="repeat">
+      <a:schemeClr val="tx1"/>
+    </dgm:txFillClrLst>
+    <dgm:txEffectClrLst/>
+  </dgm:styleLbl>
+  <dgm:styleLbl name="parChTrans1D3">
+    <dgm:fillClrLst meth="repeat">
+      <a:schemeClr val="accent4">
+        <a:tint val="70000"/>
+      </a:schemeClr>
+    </dgm:fillClrLst>
+    <dgm:linClrLst meth="repeat">
+      <a:schemeClr val="accent3"/>
+    </dgm:linClrLst>
+    <dgm:effectClrLst/>
+    <dgm:txLinClrLst/>
+    <dgm:txFillClrLst meth="repeat">
+      <a:schemeClr val="tx1"/>
+    </dgm:txFillClrLst>
+    <dgm:txEffectClrLst/>
+  </dgm:styleLbl>
+  <dgm:styleLbl name="parChTrans1D4">
+    <dgm:fillClrLst meth="repeat">
+      <a:schemeClr val="accent5">
+        <a:tint val="50000"/>
+      </a:schemeClr>
+    </dgm:fillClrLst>
+    <dgm:linClrLst meth="repeat">
+      <a:schemeClr val="accent4"/>
+    </dgm:linClrLst>
+    <dgm:effectClrLst/>
+    <dgm:txLinClrLst/>
+    <dgm:txFillClrLst meth="repeat">
+      <a:schemeClr val="tx1"/>
+    </dgm:txFillClrLst>
+    <dgm:txEffectClrLst/>
+  </dgm:styleLbl>
+  <dgm:styleLbl name="fgAcc1">
+    <dgm:fillClrLst meth="repeat">
+      <a:schemeClr val="lt1">
+        <a:alpha val="90000"/>
+      </a:schemeClr>
+    </dgm:fillClrLst>
+    <dgm:linClrLst meth="repeat">
+      <a:schemeClr val="accent2"/>
+      <a:schemeClr val="accent3"/>
+      <a:schemeClr val="accent4"/>
+      <a:schemeClr val="accent5"/>
+      <a:schemeClr val="accent6"/>
+    </dgm:linClrLst>
+    <dgm:effectClrLst/>
+    <dgm:txLinClrLst/>
+    <dgm:txFillClrLst meth="repeat">
+      <a:schemeClr val="dk1"/>
+    </dgm:txFillClrLst>
+    <dgm:txEffectClrLst/>
+  </dgm:styleLbl>
+  <dgm:styleLbl name="conFgAcc1">
+    <dgm:fillClrLst meth="repeat">
+      <a:schemeClr val="lt1">
+        <a:alpha val="90000"/>
+      </a:schemeClr>
+    </dgm:fillClrLst>
+    <dgm:linClrLst meth="repeat">
+      <a:schemeClr val="accent2"/>
+      <a:schemeClr val="accent3"/>
+      <a:schemeClr val="accent4"/>
+      <a:schemeClr val="accent5"/>
+      <a:schemeClr val="accent6"/>
+    </dgm:linClrLst>
+    <dgm:effectClrLst/>
+    <dgm:txLinClrLst/>
+    <dgm:txFillClrLst meth="repeat">
+      <a:schemeClr val="dk1"/>
+    </dgm:txFillClrLst>
+    <dgm:txEffectClrLst/>
+  </dgm:styleLbl>
+  <dgm:styleLbl name="alignAcc1">
+    <dgm:fillClrLst meth="repeat">
+      <a:schemeClr val="lt1">
+        <a:alpha val="90000"/>
+      </a:schemeClr>
+    </dgm:fillClrLst>
+    <dgm:linClrLst meth="repeat">
+      <a:schemeClr val="accent2"/>
+      <a:schemeClr val="accent3"/>
+      <a:schemeClr val="accent4"/>
+      <a:schemeClr val="accent5"/>
+      <a:schemeClr val="accent6"/>
+    </dgm:linClrLst>
+    <dgm:effectClrLst/>
+    <dgm:txLinClrLst/>
+    <dgm:txFillClrLst meth="repeat">
+      <a:schemeClr val="dk1"/>
+    </dgm:txFillClrLst>
+    <dgm:txEffectClrLst/>
+  </dgm:styleLbl>
+  <dgm:styleLbl name="trAlignAcc1">
+    <dgm:fillClrLst meth="repeat">
+      <a:schemeClr val="lt1">
+        <a:alpha val="40000"/>
+      </a:schemeClr>
+    </dgm:fillClrLst>
+    <dgm:linClrLst meth="repeat">
+      <a:schemeClr val="accent1"/>
+    </dgm:linClrLst>
+    <dgm:effectClrLst/>
+    <dgm:txLinClrLst/>
+    <dgm:txFillClrLst meth="repeat">
+      <a:schemeClr val="dk1"/>
+    </dgm:txFillClrLst>
+    <dgm:txEffectClrLst/>
+  </dgm:styleLbl>
+  <dgm:styleLbl name="bgAcc1">
+    <dgm:fillClrLst meth="repeat">
+      <a:schemeClr val="lt1">
+        <a:alpha val="90000"/>
+      </a:schemeClr>
+    </dgm:fillClrLst>
+    <dgm:linClrLst meth="repeat">
+      <a:schemeClr val="accent2"/>
+      <a:schemeClr val="accent3"/>
+      <a:schemeClr val="accent4"/>
+      <a:schemeClr val="accent5"/>
+      <a:schemeClr val="accent6"/>
+    </dgm:linClrLst>
+    <dgm:effectClrLst/>
+    <dgm:txLinClrLst/>
+    <dgm:txFillClrLst meth="repeat">
+      <a:schemeClr val="dk1"/>
+    </dgm:txFillClrLst>
+    <dgm:txEffectClrLst/>
+  </dgm:styleLbl>
+  <dgm:styleLbl name="solidFgAcc1">
+    <dgm:fillClrLst meth="repeat">
+      <a:schemeClr val="lt1"/>
+    </dgm:fillClrLst>
+    <dgm:linClrLst meth="repeat">
+      <a:schemeClr val="accent2"/>
+      <a:schemeClr val="accent3"/>
+      <a:schemeClr val="accent4"/>
+      <a:schemeClr val="accent5"/>
+      <a:schemeClr val="accent6"/>
+    </dgm:linClrLst>
+    <dgm:effectClrLst/>
+    <dgm:txLinClrLst/>
+    <dgm:txFillClrLst meth="repeat">
+      <a:schemeClr val="dk1"/>
+    </dgm:txFillClrLst>
+    <dgm:txEffectClrLst/>
+  </dgm:styleLbl>
+  <dgm:styleLbl name="solidAlignAcc1">
+    <dgm:fillClrLst meth="repeat">
+      <a:schemeClr val="lt1"/>
+    </dgm:fillClrLst>
+    <dgm:linClrLst meth="repeat">
+      <a:schemeClr val="accent2"/>
+      <a:schemeClr val="accent3"/>
+      <a:schemeClr val="accent4"/>
+      <a:schemeClr val="accent5"/>
+      <a:schemeClr val="accent6"/>
+    </dgm:linClrLst>
+    <dgm:effectClrLst/>
+    <dgm:txLinClrLst/>
+    <dgm:txFillClrLst meth="repeat">
+      <a:schemeClr val="dk1"/>
+    </dgm:txFillClrLst>
+    <dgm:txEffectClrLst/>
+  </dgm:styleLbl>
+  <dgm:styleLbl name="solidBgAcc1">
+    <dgm:fillClrLst meth="repeat">
+      <a:schemeClr val="lt1"/>
+    </dgm:fillClrLst>
+    <dgm:linClrLst meth="repeat">
+      <a:schemeClr val="accent2"/>
+      <a:schemeClr val="accent3"/>
+      <a:schemeClr val="accent4"/>
+      <a:schemeClr val="accent5"/>
+      <a:schemeClr val="accent6"/>
+    </dgm:linClrLst>
+    <dgm:effectClrLst/>
+    <dgm:txLinClrLst/>
+    <dgm:txFillClrLst meth="repeat">
+      <a:schemeClr val="dk1"/>
+    </dgm:txFillClrLst>
+    <dgm:txEffectClrLst/>
+  </dgm:styleLbl>
+  <dgm:styleLbl name="fgAccFollowNode1">
+    <dgm:fillClrLst meth="repeat">
+      <a:schemeClr val="accent2">
+        <a:tint val="40000"/>
+        <a:alpha val="90000"/>
+      </a:schemeClr>
+      <a:schemeClr val="accent3">
+        <a:tint val="40000"/>
+        <a:alpha val="90000"/>
+      </a:schemeClr>
+      <a:schemeClr val="accent4">
+        <a:tint val="40000"/>
+        <a:alpha val="90000"/>
+      </a:schemeClr>
+      <a:schemeClr val="accent5">
+        <a:tint val="40000"/>
+        <a:alpha val="90000"/>
+      </a:schemeClr>
+      <a:schemeClr val="accent6">
+        <a:tint val="40000"/>
+        <a:alpha val="90000"/>
+      </a:schemeClr>
+    </dgm:fillClrLst>
+    <dgm:linClrLst meth="repeat">
+      <a:schemeClr val="accent2">
+        <a:tint val="40000"/>
+        <a:alpha val="90000"/>
+      </a:schemeClr>
+      <a:schemeClr val="accent3">
+        <a:tint val="40000"/>
+        <a:alpha val="90000"/>
+      </a:schemeClr>
+      <a:schemeClr val="accent4">
+        <a:tint val="40000"/>
+        <a:alpha val="90000"/>
+      </a:schemeClr>
+      <a:schemeClr val="accent5">
+        <a:tint val="40000"/>
+        <a:alpha val="90000"/>
+      </a:schemeClr>
+      <a:schemeClr val="accent6">
+        <a:tint val="40000"/>
+        <a:alpha val="90000"/>
+      </a:schemeClr>
+    </dgm:linClrLst>
+    <dgm:effectClrLst/>
+    <dgm:txLinClrLst/>
+    <dgm:txFillClrLst meth="repeat">
+      <a:schemeClr val="dk1"/>
+    </dgm:txFillClrLst>
+    <dgm:txEffectClrLst/>
+  </dgm:styleLbl>
+  <dgm:styleLbl name="alignAccFollowNode1">
+    <dgm:fillClrLst meth="repeat">
+      <a:schemeClr val="accent2">
+        <a:tint val="40000"/>
+        <a:alpha val="90000"/>
+      </a:schemeClr>
+      <a:schemeClr val="accent3">
+        <a:tint val="40000"/>
+        <a:alpha val="90000"/>
+      </a:schemeClr>
+      <a:schemeClr val="accent4">
+        <a:tint val="40000"/>
+        <a:alpha val="90000"/>
+      </a:schemeClr>
+      <a:schemeClr val="accent5">
+        <a:tint val="40000"/>
+        <a:alpha val="90000"/>
+      </a:schemeClr>
+      <a:schemeClr val="accent6">
+        <a:tint val="40000"/>
+        <a:alpha val="90000"/>
+      </a:schemeClr>
+    </dgm:fillClrLst>
+    <dgm:linClrLst meth="repeat">
+      <a:schemeClr val="accent2">
+        <a:tint val="40000"/>
+        <a:alpha val="90000"/>
+      </a:schemeClr>
+      <a:schemeClr val="accent3">
+        <a:tint val="40000"/>
+        <a:alpha val="90000"/>
+      </a:schemeClr>
+      <a:schemeClr val="accent4">
+        <a:tint val="40000"/>
+        <a:alpha val="90000"/>
+      </a:schemeClr>
+      <a:schemeClr val="accent5">
+        <a:tint val="40000"/>
+        <a:alpha val="90000"/>
+      </a:schemeClr>
+      <a:schemeClr val="accent6">
+        <a:tint val="40000"/>
+        <a:alpha val="90000"/>
+      </a:schemeClr>
+    </dgm:linClrLst>
+    <dgm:effectClrLst/>
+    <dgm:txLinClrLst/>
+    <dgm:txFillClrLst meth="repeat">
+      <a:schemeClr val="dk1"/>
+    </dgm:txFillClrLst>
+    <dgm:txEffectClrLst/>
+  </dgm:styleLbl>
+  <dgm:styleLbl name="bgAccFollowNode1">
+    <dgm:fillClrLst meth="repeat">
+      <a:schemeClr val="accent2">
+        <a:tint val="40000"/>
+        <a:alpha val="90000"/>
+      </a:schemeClr>
+      <a:schemeClr val="accent3">
+        <a:tint val="40000"/>
+        <a:alpha val="90000"/>
+      </a:schemeClr>
+      <a:schemeClr val="accent4">
+        <a:tint val="40000"/>
+        <a:alpha val="90000"/>
+      </a:schemeClr>
+      <a:schemeClr val="accent5">
+        <a:tint val="40000"/>
+        <a:alpha val="90000"/>
+      </a:schemeClr>
+      <a:schemeClr val="accent6">
+        <a:tint val="40000"/>
+        <a:alpha val="90000"/>
+      </a:schemeClr>
+    </dgm:fillClrLst>
+    <dgm:linClrLst meth="repeat">
+      <a:schemeClr val="accent2">
+        <a:tint val="40000"/>
+        <a:alpha val="90000"/>
+      </a:schemeClr>
+      <a:schemeClr val="accent3">
+        <a:tint val="40000"/>
+        <a:alpha val="90000"/>
+      </a:schemeClr>
+      <a:schemeClr val="accent4">
+        <a:tint val="40000"/>
+        <a:alpha val="90000"/>
+      </a:schemeClr>
+      <a:schemeClr val="accent5">
+        <a:tint val="40000"/>
+        <a:alpha val="90000"/>
+      </a:schemeClr>
+      <a:schemeClr val="accent6">
+        <a:tint val="40000"/>
+        <a:alpha val="90000"/>
+      </a:schemeClr>
+    </dgm:linClrLst>
+    <dgm:effectClrLst/>
+    <dgm:txLinClrLst/>
+    <dgm:txFillClrLst meth="repeat">
+      <a:schemeClr val="dk1"/>
+    </dgm:txFillClrLst>
+    <dgm:txEffectClrLst/>
+  </dgm:styleLbl>
+  <dgm:styleLbl name="fgAcc0">
+    <dgm:fillClrLst meth="repeat">
+      <a:schemeClr val="lt1">
+        <a:alpha val="90000"/>
+      </a:schemeClr>
+    </dgm:fillClrLst>
+    <dgm:linClrLst>
+      <a:schemeClr val="accent1"/>
+    </dgm:linClrLst>
+    <dgm:effectClrLst/>
+    <dgm:txLinClrLst/>
+    <dgm:txFillClrLst meth="repeat">
+      <a:schemeClr val="dk1"/>
+    </dgm:txFillClrLst>
+    <dgm:txEffectClrLst/>
+  </dgm:styleLbl>
+  <dgm:styleLbl name="fgAcc2">
+    <dgm:fillClrLst meth="repeat">
+      <a:schemeClr val="lt1">
+        <a:alpha val="90000"/>
+      </a:schemeClr>
+    </dgm:fillClrLst>
+    <dgm:linClrLst>
+      <a:schemeClr val="accent2"/>
+    </dgm:linClrLst>
+    <dgm:effectClrLst/>
+    <dgm:txLinClrLst/>
+    <dgm:txFillClrLst meth="repeat">
+      <a:schemeClr val="dk1"/>
+    </dgm:txFillClrLst>
+    <dgm:txEffectClrLst/>
+  </dgm:styleLbl>
+  <dgm:styleLbl name="fgAcc3">
+    <dgm:fillClrLst meth="repeat">
+      <a:schemeClr val="lt1">
+        <a:alpha val="90000"/>
+      </a:schemeClr>
+    </dgm:fillClrLst>
+    <dgm:linClrLst>
+      <a:schemeClr val="accent3"/>
+    </dgm:linClrLst>
+    <dgm:effectClrLst/>
+    <dgm:txLinClrLst/>
+    <dgm:txFillClrLst meth="repeat">
+      <a:schemeClr val="dk1"/>
+    </dgm:txFillClrLst>
+    <dgm:txEffectClrLst/>
+  </dgm:styleLbl>
+  <dgm:styleLbl name="fgAcc4">
+    <dgm:fillClrLst meth="repeat">
+      <a:schemeClr val="lt1">
+        <a:alpha val="90000"/>
+      </a:schemeClr>
+    </dgm:fillClrLst>
+    <dgm:linClrLst>
+      <a:schemeClr val="accent4"/>
+    </dgm:linClrLst>
+    <dgm:effectClrLst/>
+    <dgm:txLinClrLst/>
+    <dgm:txFillClrLst meth="repeat">
+      <a:schemeClr val="dk1"/>
+    </dgm:txFillClrLst>
+    <dgm:txEffectClrLst/>
+  </dgm:styleLbl>
+  <dgm:styleLbl name="bgShp">
+    <dgm:fillClrLst meth="repeat">
+      <a:schemeClr val="accent2">
+        <a:tint val="40000"/>
+      </a:schemeClr>
+    </dgm:fillClrLst>
+    <dgm:linClrLst meth="repeat">
+      <a:schemeClr val="dk1"/>
+    </dgm:linClrLst>
+    <dgm:effectClrLst/>
+    <dgm:txLinClrLst/>
+    <dgm:txFillClrLst meth="repeat">
+      <a:schemeClr val="dk1"/>
+    </dgm:txFillClrLst>
+    <dgm:txEffectClrLst/>
+  </dgm:styleLbl>
+  <dgm:styleLbl name="dkBgShp">
+    <dgm:fillClrLst meth="repeat">
+      <a:schemeClr val="accent2">
+        <a:shade val="90000"/>
+      </a:schemeClr>
+    </dgm:fillClrLst>
+    <dgm:linClrLst meth="repeat">
+      <a:schemeClr val="dk1"/>
+    </dgm:linClrLst>
+    <dgm:effectClrLst/>
+    <dgm:txLinClrLst/>
+    <dgm:txFillClrLst meth="repeat">
+      <a:schemeClr val="lt1"/>
+    </dgm:txFillClrLst>
+    <dgm:txEffectClrLst/>
+  </dgm:styleLbl>
+  <dgm:styleLbl name="trBgShp">
+    <dgm:fillClrLst meth="repeat">
+      <a:schemeClr val="accent1">
+        <a:tint val="50000"/>
+        <a:alpha val="40000"/>
+      </a:schemeClr>
+    </dgm:fillClrLst>
+    <dgm:linClrLst meth="repeat">
+      <a:schemeClr val="accent2"/>
+    </dgm:linClrLst>
+    <dgm:effectClrLst/>
+    <dgm:txLinClrLst/>
+    <dgm:txFillClrLst meth="repeat">
+      <a:schemeClr val="lt1"/>
+    </dgm:txFillClrLst>
+    <dgm:txEffectClrLst/>
+  </dgm:styleLbl>
+  <dgm:styleLbl name="fgShp">
+    <dgm:fillClrLst meth="repeat">
+      <a:schemeClr val="accent2">
+        <a:tint val="40000"/>
+      </a:schemeClr>
+    </dgm:fillClrLst>
+    <dgm:linClrLst meth="repeat">
+      <a:schemeClr val="lt1"/>
+    </dgm:linClrLst>
+    <dgm:effectClrLst/>
+    <dgm:txLinClrLst/>
+    <dgm:txFillClrLst meth="repeat">
+      <a:schemeClr val="dk1"/>
+    </dgm:txFillClrLst>
+    <dgm:txEffectClrLst/>
+  </dgm:styleLbl>
+  <dgm:styleLbl name="revTx">
+    <dgm:fillClrLst meth="repeat">
+      <a:schemeClr val="lt1">
+        <a:alpha val="0"/>
+      </a:schemeClr>
+    </dgm:fillClrLst>
+    <dgm:linClrLst meth="repeat">
+      <a:schemeClr val="dk1">
+        <a:alpha val="0"/>
+      </a:schemeClr>
+    </dgm:linClrLst>
+    <dgm:effectClrLst/>
+    <dgm:txLinClrLst/>
+    <dgm:txFillClrLst meth="repeat">
+      <a:schemeClr val="tx1"/>
+    </dgm:txFillClrLst>
+    <dgm:txEffectClrLst/>
+  </dgm:styleLbl>
+</dgm:colorsDef>
+</file>
+
+<file path=ppt/diagrams/colors5.xml><?xml version="1.0" encoding="utf-8"?>
 <dgm:colorsDef xmlns:dgm="http://schemas.openxmlformats.org/drawingml/2006/diagram" xmlns:a="http://schemas.openxmlformats.org/drawingml/2006/main" uniqueId="urn:microsoft.com/office/officeart/2018/5/colors/Iconchunking_neutralicontext_colorful1">
   <dgm:title val=""/>
   <dgm:desc val=""/>
@@ -4458,13 +5378,13 @@
     <dgm:cxn modelId="{7D583B2E-DB39-B24B-B22B-261D0DD4AAC6}" type="presOf" srcId="{81E93E00-EAC2-4F50-A91D-B7A38B4DF4AB}" destId="{00B1DF46-AFCC-3A4C-A3C3-D23A89401028}" srcOrd="0" destOrd="0" presId="urn:microsoft.com/office/officeart/2005/8/layout/vList5"/>
     <dgm:cxn modelId="{CDED4A30-F688-40C1-BF89-2ECF3A69D17A}" srcId="{81E93E00-EAC2-4F50-A91D-B7A38B4DF4AB}" destId="{31A58D26-7D2B-4281-96EF-5CD1B2F2B761}" srcOrd="0" destOrd="0" parTransId="{794C5940-0BD3-420C-ADF0-1C45EF86878D}" sibTransId="{157A767E-F552-4B8E-8D22-0B83066D1BDA}"/>
     <dgm:cxn modelId="{1503CB3F-C9CF-49C7-8298-0EEC70C0F610}" srcId="{31A58D26-7D2B-4281-96EF-5CD1B2F2B761}" destId="{90EC2A64-4E77-4212-8D11-9BF24BB76557}" srcOrd="1" destOrd="0" parTransId="{CBB2C07E-CB40-4A8C-A027-819616635AD2}" sibTransId="{EF9EE420-3BBE-4FD4-B333-D889083E70B4}"/>
+    <dgm:cxn modelId="{8F00E560-55FF-4E5B-8BB6-2545159F907C}" srcId="{59377274-1E39-4216-9452-636BB91D1225}" destId="{41446312-936D-4603-BBA7-BFEEB1A04E4F}" srcOrd="2" destOrd="0" parTransId="{924E8D4B-522E-4A7B-90E5-31195AEC3D1D}" sibTransId="{BB8D8E58-2D11-4274-AD5F-030D2C372945}"/>
+    <dgm:cxn modelId="{F05CE966-45FE-884F-8F43-9DC7D1EC8115}" type="presOf" srcId="{31A58D26-7D2B-4281-96EF-5CD1B2F2B761}" destId="{95FE83E5-4FD0-9B43-A6DC-69C883CD6721}" srcOrd="0" destOrd="0" presId="urn:microsoft.com/office/officeart/2005/8/layout/vList5"/>
     <dgm:cxn modelId="{90903F47-3291-8B4D-96C7-1B815668C900}" type="presOf" srcId="{6FE01465-855B-474C-99F9-AA22FE567472}" destId="{0D73A0E0-ED2E-3D4E-8152-E0F20C9A8AC2}" srcOrd="0" destOrd="0" presId="urn:microsoft.com/office/officeart/2005/8/layout/vList5"/>
     <dgm:cxn modelId="{262E8347-0843-46DF-8EFB-5A7AFE8915E8}" srcId="{56EDD533-AF4B-45D4-A877-6C6E7E61639A}" destId="{81E93E00-EAC2-4F50-A91D-B7A38B4DF4AB}" srcOrd="1" destOrd="0" parTransId="{89162E70-62FB-4057-B1A8-49D5525E7BE2}" sibTransId="{D00B9FA8-5A80-4C2A-9C8E-B3649C3497D3}"/>
-    <dgm:cxn modelId="{D5F34559-56D7-1943-9154-6095A36501C5}" type="presOf" srcId="{CCDCC2D7-5155-4EEA-9575-BAE466E2B82D}" destId="{95FE83E5-4FD0-9B43-A6DC-69C883CD6721}" srcOrd="0" destOrd="6" presId="urn:microsoft.com/office/officeart/2005/8/layout/vList5"/>
-    <dgm:cxn modelId="{8F00E560-55FF-4E5B-8BB6-2545159F907C}" srcId="{59377274-1E39-4216-9452-636BB91D1225}" destId="{41446312-936D-4603-BBA7-BFEEB1A04E4F}" srcOrd="2" destOrd="0" parTransId="{924E8D4B-522E-4A7B-90E5-31195AEC3D1D}" sibTransId="{BB8D8E58-2D11-4274-AD5F-030D2C372945}"/>
-    <dgm:cxn modelId="{F05CE966-45FE-884F-8F43-9DC7D1EC8115}" type="presOf" srcId="{31A58D26-7D2B-4281-96EF-5CD1B2F2B761}" destId="{95FE83E5-4FD0-9B43-A6DC-69C883CD6721}" srcOrd="0" destOrd="0" presId="urn:microsoft.com/office/officeart/2005/8/layout/vList5"/>
     <dgm:cxn modelId="{356D0B6D-D164-4261-8481-7971221B1A1F}" srcId="{56EDD533-AF4B-45D4-A877-6C6E7E61639A}" destId="{6FE01465-855B-474C-99F9-AA22FE567472}" srcOrd="0" destOrd="0" parTransId="{09461485-FDA1-490E-BA97-0C2A60C9F00F}" sibTransId="{3CAF8328-A00A-4874-B41E-83960BE85AFE}"/>
     <dgm:cxn modelId="{1254A778-C64B-4528-A182-EC5A56071EFC}" srcId="{31A58D26-7D2B-4281-96EF-5CD1B2F2B761}" destId="{A26E3BD7-1677-403B-B025-CB5D2E17C986}" srcOrd="2" destOrd="0" parTransId="{509CF13A-021F-4AB5-8332-ABC8F814E4B0}" sibTransId="{80DFFF68-4DA3-4BA1-9DE8-F990E15CF304}"/>
+    <dgm:cxn modelId="{D5F34559-56D7-1943-9154-6095A36501C5}" type="presOf" srcId="{CCDCC2D7-5155-4EEA-9575-BAE466E2B82D}" destId="{95FE83E5-4FD0-9B43-A6DC-69C883CD6721}" srcOrd="0" destOrd="6" presId="urn:microsoft.com/office/officeart/2005/8/layout/vList5"/>
     <dgm:cxn modelId="{DD44277F-4226-4CC2-A8EC-D90DBCB58E32}" srcId="{59377274-1E39-4216-9452-636BB91D1225}" destId="{CCDCC2D7-5155-4EEA-9575-BAE466E2B82D}" srcOrd="0" destOrd="0" parTransId="{164F7E3C-69CB-4777-9A98-1DAFE85F8EE0}" sibTransId="{879D4A31-FCCF-4876-B96A-F7E0085E556D}"/>
     <dgm:cxn modelId="{88283181-9AB9-5342-9A4B-CA142DA2D9F4}" type="presOf" srcId="{D2D908EF-7380-4C6D-A2E1-87C8A239E35D}" destId="{95FE83E5-4FD0-9B43-A6DC-69C883CD6721}" srcOrd="0" destOrd="4" presId="urn:microsoft.com/office/officeart/2005/8/layout/vList5"/>
     <dgm:cxn modelId="{549B2F83-EF9B-704F-A003-315D476F4270}" type="presOf" srcId="{F2903DD0-1CA9-4EDD-9250-8D9F4A57EFB9}" destId="{95FE83E5-4FD0-9B43-A6DC-69C883CD6721}" srcOrd="0" destOrd="7" presId="urn:microsoft.com/office/officeart/2005/8/layout/vList5"/>
@@ -4495,6 +5415,386 @@
 </file>
 
 <file path=ppt/diagrams/data2.xml><?xml version="1.0" encoding="utf-8"?>
+<dgm:dataModel xmlns:dgm="http://schemas.openxmlformats.org/drawingml/2006/diagram" xmlns:a="http://schemas.openxmlformats.org/drawingml/2006/main">
+  <dgm:ptLst>
+    <dgm:pt modelId="{D40096CA-2EB7-473A-B5B9-A2A8DDCDCDF5}" type="doc">
+      <dgm:prSet loTypeId="urn:microsoft.com/office/officeart/2005/8/layout/default" loCatId="list" qsTypeId="urn:microsoft.com/office/officeart/2005/8/quickstyle/simple1" qsCatId="simple" csTypeId="urn:microsoft.com/office/officeart/2005/8/colors/colorful1" csCatId="colorful" phldr="1"/>
+      <dgm:spPr/>
+      <dgm:t>
+        <a:bodyPr/>
+        <a:lstStyle/>
+        <a:p>
+          <a:endParaRPr lang="en-US"/>
+        </a:p>
+      </dgm:t>
+    </dgm:pt>
+    <dgm:pt modelId="{AB39FC06-2E4B-46F3-873F-0A6092D7CE76}">
+      <dgm:prSet custT="1"/>
+      <dgm:spPr/>
+      <dgm:t>
+        <a:bodyPr/>
+        <a:lstStyle/>
+        <a:p>
+          <a:r>
+            <a:rPr lang="en-US" sz="2800" b="1" baseline="0" dirty="0"/>
+            <a:t>string</a:t>
+          </a:r>
+          <a:r>
+            <a:rPr lang="en-US" sz="1700" baseline="0" dirty="0"/>
+            <a:t>: a sequence of Unicode characters representing some text, like "hello".</a:t>
+          </a:r>
+          <a:endParaRPr lang="en-US" sz="1700" dirty="0"/>
+        </a:p>
+      </dgm:t>
+    </dgm:pt>
+    <dgm:pt modelId="{B767DA5F-5E76-494A-B6AF-35C42D4632D7}" type="parTrans" cxnId="{CFA92978-2C05-4102-9F1E-0EAE00515FAB}">
+      <dgm:prSet/>
+      <dgm:spPr/>
+      <dgm:t>
+        <a:bodyPr/>
+        <a:lstStyle/>
+        <a:p>
+          <a:endParaRPr lang="en-US"/>
+        </a:p>
+      </dgm:t>
+    </dgm:pt>
+    <dgm:pt modelId="{F5F8D5EA-1B5B-4965-ADFB-AE355CA5524E}" type="sibTrans" cxnId="{CFA92978-2C05-4102-9F1E-0EAE00515FAB}">
+      <dgm:prSet/>
+      <dgm:spPr/>
+      <dgm:t>
+        <a:bodyPr/>
+        <a:lstStyle/>
+        <a:p>
+          <a:endParaRPr lang="en-US"/>
+        </a:p>
+      </dgm:t>
+    </dgm:pt>
+    <dgm:pt modelId="{F3EB16DD-1B18-49E4-994F-113FB41EC93C}">
+      <dgm:prSet custT="1"/>
+      <dgm:spPr/>
+      <dgm:t>
+        <a:bodyPr/>
+        <a:lstStyle/>
+        <a:p>
+          <a:r>
+            <a:rPr lang="en-US" sz="2400" b="1" baseline="0" dirty="0"/>
+            <a:t>number</a:t>
+          </a:r>
+          <a:r>
+            <a:rPr lang="en-US" sz="1700" baseline="0" dirty="0"/>
+            <a:t>: a numeric value. The number type can represent both whole numbers like 15 and fractional values like 6.283185.</a:t>
+          </a:r>
+          <a:endParaRPr lang="en-US" sz="1700" dirty="0"/>
+        </a:p>
+      </dgm:t>
+    </dgm:pt>
+    <dgm:pt modelId="{0DD1A776-240C-493C-8399-386F3F2ECEF1}" type="parTrans" cxnId="{F4AF68C6-4F81-407D-ABD5-D92B2E691864}">
+      <dgm:prSet/>
+      <dgm:spPr/>
+      <dgm:t>
+        <a:bodyPr/>
+        <a:lstStyle/>
+        <a:p>
+          <a:endParaRPr lang="en-US"/>
+        </a:p>
+      </dgm:t>
+    </dgm:pt>
+    <dgm:pt modelId="{5EE486AC-594A-4375-B0A9-207A846D53AC}" type="sibTrans" cxnId="{F4AF68C6-4F81-407D-ABD5-D92B2E691864}">
+      <dgm:prSet/>
+      <dgm:spPr/>
+      <dgm:t>
+        <a:bodyPr/>
+        <a:lstStyle/>
+        <a:p>
+          <a:endParaRPr lang="en-US"/>
+        </a:p>
+      </dgm:t>
+    </dgm:pt>
+    <dgm:pt modelId="{F448D0A8-94A8-461B-8987-DDBA48BEE41B}">
+      <dgm:prSet custT="1"/>
+      <dgm:spPr/>
+      <dgm:t>
+        <a:bodyPr/>
+        <a:lstStyle/>
+        <a:p>
+          <a:r>
+            <a:rPr lang="en-US" sz="2400" b="1" baseline="0" dirty="0"/>
+            <a:t>bool</a:t>
+          </a:r>
+          <a:r>
+            <a:rPr lang="en-US" sz="1700" baseline="0" dirty="0"/>
+            <a:t>: a boolean value, either true or false. bool values can be used in conditional logic.</a:t>
+          </a:r>
+          <a:endParaRPr lang="en-US" sz="1700" dirty="0"/>
+        </a:p>
+      </dgm:t>
+    </dgm:pt>
+    <dgm:pt modelId="{21232189-048F-4204-9BE6-6C347DFAD895}" type="parTrans" cxnId="{42EAB465-4A7F-4489-8AEA-89BE0973C55C}">
+      <dgm:prSet/>
+      <dgm:spPr/>
+      <dgm:t>
+        <a:bodyPr/>
+        <a:lstStyle/>
+        <a:p>
+          <a:endParaRPr lang="en-US"/>
+        </a:p>
+      </dgm:t>
+    </dgm:pt>
+    <dgm:pt modelId="{B5FC1798-2D51-40A3-8C68-7D79A613B5C1}" type="sibTrans" cxnId="{42EAB465-4A7F-4489-8AEA-89BE0973C55C}">
+      <dgm:prSet/>
+      <dgm:spPr/>
+      <dgm:t>
+        <a:bodyPr/>
+        <a:lstStyle/>
+        <a:p>
+          <a:endParaRPr lang="en-US"/>
+        </a:p>
+      </dgm:t>
+    </dgm:pt>
+    <dgm:pt modelId="{76014526-35F5-472E-AA19-073B872C7A76}">
+      <dgm:prSet custT="1"/>
+      <dgm:spPr/>
+      <dgm:t>
+        <a:bodyPr/>
+        <a:lstStyle/>
+        <a:p>
+          <a:r>
+            <a:rPr lang="en-US" sz="2400" b="1" baseline="0" dirty="0"/>
+            <a:t>list</a:t>
+          </a:r>
+          <a:r>
+            <a:rPr lang="en-US" sz="1700" baseline="0" dirty="0"/>
+            <a:t>: a sequence of values, like ["us-west-1a", "us-west-1c"]. Identify elements in a list with consecutive whole numbers, starting with zero.</a:t>
+          </a:r>
+          <a:endParaRPr lang="en-US" sz="1700" dirty="0"/>
+        </a:p>
+      </dgm:t>
+    </dgm:pt>
+    <dgm:pt modelId="{2B1B6D3F-83EF-4DBB-BCE1-1F1D3C92BB9B}" type="parTrans" cxnId="{7A108973-2488-455A-B8BE-1EC690AEE057}">
+      <dgm:prSet/>
+      <dgm:spPr/>
+      <dgm:t>
+        <a:bodyPr/>
+        <a:lstStyle/>
+        <a:p>
+          <a:endParaRPr lang="en-US"/>
+        </a:p>
+      </dgm:t>
+    </dgm:pt>
+    <dgm:pt modelId="{8CE413A3-0A50-4AEB-8066-51F5F932E261}" type="sibTrans" cxnId="{7A108973-2488-455A-B8BE-1EC690AEE057}">
+      <dgm:prSet/>
+      <dgm:spPr/>
+      <dgm:t>
+        <a:bodyPr/>
+        <a:lstStyle/>
+        <a:p>
+          <a:endParaRPr lang="en-US"/>
+        </a:p>
+      </dgm:t>
+    </dgm:pt>
+    <dgm:pt modelId="{23E50043-CFDC-4163-9499-7CC405561DEE}">
+      <dgm:prSet custT="1"/>
+      <dgm:spPr/>
+      <dgm:t>
+        <a:bodyPr/>
+        <a:lstStyle/>
+        <a:p>
+          <a:r>
+            <a:rPr lang="en-US" sz="2800" b="1" baseline="0" dirty="0"/>
+            <a:t>set</a:t>
+          </a:r>
+          <a:r>
+            <a:rPr lang="en-US" sz="2000" baseline="0" dirty="0"/>
+            <a:t>: a collection of unique values that do not have any secondary identifiers or ordering.</a:t>
+          </a:r>
+          <a:endParaRPr lang="en-US" sz="2000" dirty="0"/>
+        </a:p>
+      </dgm:t>
+    </dgm:pt>
+    <dgm:pt modelId="{366246C8-5213-4DE1-98A7-ABD237702DE5}" type="parTrans" cxnId="{D8EACCF9-69FE-405F-B2D7-A9D380AEAC87}">
+      <dgm:prSet/>
+      <dgm:spPr/>
+      <dgm:t>
+        <a:bodyPr/>
+        <a:lstStyle/>
+        <a:p>
+          <a:endParaRPr lang="en-US"/>
+        </a:p>
+      </dgm:t>
+    </dgm:pt>
+    <dgm:pt modelId="{5DA9DA35-E707-43F4-9B29-F611795B0BE2}" type="sibTrans" cxnId="{D8EACCF9-69FE-405F-B2D7-A9D380AEAC87}">
+      <dgm:prSet/>
+      <dgm:spPr/>
+      <dgm:t>
+        <a:bodyPr/>
+        <a:lstStyle/>
+        <a:p>
+          <a:endParaRPr lang="en-US"/>
+        </a:p>
+      </dgm:t>
+    </dgm:pt>
+    <dgm:pt modelId="{683AFBFC-8125-4568-B7D1-74E9C680CC3E}">
+      <dgm:prSet custT="1"/>
+      <dgm:spPr/>
+      <dgm:t>
+        <a:bodyPr/>
+        <a:lstStyle/>
+        <a:p>
+          <a:r>
+            <a:rPr lang="en-US" sz="2000" b="1" baseline="0" dirty="0"/>
+            <a:t>map (or object)</a:t>
+          </a:r>
+          <a:r>
+            <a:rPr lang="en-US" sz="2000" baseline="0" dirty="0"/>
+            <a:t>: a group of values identified by named labels, like </a:t>
+          </a:r>
+        </a:p>
+        <a:p>
+          <a:r>
+            <a:rPr lang="en-US" sz="2000" baseline="0" dirty="0"/>
+            <a:t>{name = "Mabel", age = 52}.</a:t>
+          </a:r>
+          <a:endParaRPr lang="en-US" sz="2000" dirty="0"/>
+        </a:p>
+      </dgm:t>
+    </dgm:pt>
+    <dgm:pt modelId="{B86E1441-16F9-404A-9FD2-E4B5DCFCD680}" type="parTrans" cxnId="{9264697F-E52C-49A9-A867-DF2A1ECDC85A}">
+      <dgm:prSet/>
+      <dgm:spPr/>
+      <dgm:t>
+        <a:bodyPr/>
+        <a:lstStyle/>
+        <a:p>
+          <a:endParaRPr lang="en-US"/>
+        </a:p>
+      </dgm:t>
+    </dgm:pt>
+    <dgm:pt modelId="{8D12744F-A4D7-4D6E-A8E8-C4B2B70038E5}" type="sibTrans" cxnId="{9264697F-E52C-49A9-A867-DF2A1ECDC85A}">
+      <dgm:prSet/>
+      <dgm:spPr/>
+      <dgm:t>
+        <a:bodyPr/>
+        <a:lstStyle/>
+        <a:p>
+          <a:endParaRPr lang="en-US"/>
+        </a:p>
+      </dgm:t>
+    </dgm:pt>
+    <dgm:pt modelId="{BBC8C05A-39EA-4813-95B3-64A71489F44A}" type="pres">
+      <dgm:prSet presAssocID="{D40096CA-2EB7-473A-B5B9-A2A8DDCDCDF5}" presName="diagram" presStyleCnt="0">
+        <dgm:presLayoutVars>
+          <dgm:dir/>
+          <dgm:resizeHandles val="exact"/>
+        </dgm:presLayoutVars>
+      </dgm:prSet>
+      <dgm:spPr/>
+    </dgm:pt>
+    <dgm:pt modelId="{87F9E8F8-4E6B-4987-BAED-45874AE22D17}" type="pres">
+      <dgm:prSet presAssocID="{AB39FC06-2E4B-46F3-873F-0A6092D7CE76}" presName="node" presStyleLbl="node1" presStyleIdx="0" presStyleCnt="6">
+        <dgm:presLayoutVars>
+          <dgm:bulletEnabled val="1"/>
+        </dgm:presLayoutVars>
+      </dgm:prSet>
+      <dgm:spPr/>
+    </dgm:pt>
+    <dgm:pt modelId="{CEB356DE-DF57-48A8-A2DF-A1C71A27F99E}" type="pres">
+      <dgm:prSet presAssocID="{F5F8D5EA-1B5B-4965-ADFB-AE355CA5524E}" presName="sibTrans" presStyleCnt="0"/>
+      <dgm:spPr/>
+    </dgm:pt>
+    <dgm:pt modelId="{A6129058-4280-4597-A02B-27293ED0231D}" type="pres">
+      <dgm:prSet presAssocID="{F3EB16DD-1B18-49E4-994F-113FB41EC93C}" presName="node" presStyleLbl="node1" presStyleIdx="1" presStyleCnt="6">
+        <dgm:presLayoutVars>
+          <dgm:bulletEnabled val="1"/>
+        </dgm:presLayoutVars>
+      </dgm:prSet>
+      <dgm:spPr/>
+    </dgm:pt>
+    <dgm:pt modelId="{49432974-A3B1-4607-9B92-E71519F3B713}" type="pres">
+      <dgm:prSet presAssocID="{5EE486AC-594A-4375-B0A9-207A846D53AC}" presName="sibTrans" presStyleCnt="0"/>
+      <dgm:spPr/>
+    </dgm:pt>
+    <dgm:pt modelId="{2A250286-4B13-4850-B8A6-C4F2D0762509}" type="pres">
+      <dgm:prSet presAssocID="{F448D0A8-94A8-461B-8987-DDBA48BEE41B}" presName="node" presStyleLbl="node1" presStyleIdx="2" presStyleCnt="6">
+        <dgm:presLayoutVars>
+          <dgm:bulletEnabled val="1"/>
+        </dgm:presLayoutVars>
+      </dgm:prSet>
+      <dgm:spPr/>
+    </dgm:pt>
+    <dgm:pt modelId="{FFCF6A25-E906-44CD-BE82-76E15A876246}" type="pres">
+      <dgm:prSet presAssocID="{B5FC1798-2D51-40A3-8C68-7D79A613B5C1}" presName="sibTrans" presStyleCnt="0"/>
+      <dgm:spPr/>
+    </dgm:pt>
+    <dgm:pt modelId="{17668B9E-ED61-4A35-BE1B-723901C48B55}" type="pres">
+      <dgm:prSet presAssocID="{76014526-35F5-472E-AA19-073B872C7A76}" presName="node" presStyleLbl="node1" presStyleIdx="3" presStyleCnt="6">
+        <dgm:presLayoutVars>
+          <dgm:bulletEnabled val="1"/>
+        </dgm:presLayoutVars>
+      </dgm:prSet>
+      <dgm:spPr/>
+    </dgm:pt>
+    <dgm:pt modelId="{31CD4BEF-2981-4779-9DA3-6738F49DAF46}" type="pres">
+      <dgm:prSet presAssocID="{8CE413A3-0A50-4AEB-8066-51F5F932E261}" presName="sibTrans" presStyleCnt="0"/>
+      <dgm:spPr/>
+    </dgm:pt>
+    <dgm:pt modelId="{532B7FF9-76E8-4A44-B21A-40759E3303F6}" type="pres">
+      <dgm:prSet presAssocID="{23E50043-CFDC-4163-9499-7CC405561DEE}" presName="node" presStyleLbl="node1" presStyleIdx="4" presStyleCnt="6">
+        <dgm:presLayoutVars>
+          <dgm:bulletEnabled val="1"/>
+        </dgm:presLayoutVars>
+      </dgm:prSet>
+      <dgm:spPr/>
+    </dgm:pt>
+    <dgm:pt modelId="{F06853BD-5747-4E4A-87B4-A1D16B53CFFF}" type="pres">
+      <dgm:prSet presAssocID="{5DA9DA35-E707-43F4-9B29-F611795B0BE2}" presName="sibTrans" presStyleCnt="0"/>
+      <dgm:spPr/>
+    </dgm:pt>
+    <dgm:pt modelId="{9E19E212-BBFA-4C8D-B347-CAC090EED319}" type="pres">
+      <dgm:prSet presAssocID="{683AFBFC-8125-4568-B7D1-74E9C680CC3E}" presName="node" presStyleLbl="node1" presStyleIdx="5" presStyleCnt="6">
+        <dgm:presLayoutVars>
+          <dgm:bulletEnabled val="1"/>
+        </dgm:presLayoutVars>
+      </dgm:prSet>
+      <dgm:spPr/>
+    </dgm:pt>
+  </dgm:ptLst>
+  <dgm:cxnLst>
+    <dgm:cxn modelId="{89D4D803-D3C0-416A-87E7-226227EEB892}" type="presOf" srcId="{76014526-35F5-472E-AA19-073B872C7A76}" destId="{17668B9E-ED61-4A35-BE1B-723901C48B55}" srcOrd="0" destOrd="0" presId="urn:microsoft.com/office/officeart/2005/8/layout/default"/>
+    <dgm:cxn modelId="{8728B12C-63C6-4E29-B056-DEE93557A90D}" type="presOf" srcId="{683AFBFC-8125-4568-B7D1-74E9C680CC3E}" destId="{9E19E212-BBFA-4C8D-B347-CAC090EED319}" srcOrd="0" destOrd="0" presId="urn:microsoft.com/office/officeart/2005/8/layout/default"/>
+    <dgm:cxn modelId="{1E6B455B-FDBF-4937-8ACC-642434AAD765}" type="presOf" srcId="{AB39FC06-2E4B-46F3-873F-0A6092D7CE76}" destId="{87F9E8F8-4E6B-4987-BAED-45874AE22D17}" srcOrd="0" destOrd="0" presId="urn:microsoft.com/office/officeart/2005/8/layout/default"/>
+    <dgm:cxn modelId="{42EAB465-4A7F-4489-8AEA-89BE0973C55C}" srcId="{D40096CA-2EB7-473A-B5B9-A2A8DDCDCDF5}" destId="{F448D0A8-94A8-461B-8987-DDBA48BEE41B}" srcOrd="2" destOrd="0" parTransId="{21232189-048F-4204-9BE6-6C347DFAD895}" sibTransId="{B5FC1798-2D51-40A3-8C68-7D79A613B5C1}"/>
+    <dgm:cxn modelId="{7A108973-2488-455A-B8BE-1EC690AEE057}" srcId="{D40096CA-2EB7-473A-B5B9-A2A8DDCDCDF5}" destId="{76014526-35F5-472E-AA19-073B872C7A76}" srcOrd="3" destOrd="0" parTransId="{2B1B6D3F-83EF-4DBB-BCE1-1F1D3C92BB9B}" sibTransId="{8CE413A3-0A50-4AEB-8066-51F5F932E261}"/>
+    <dgm:cxn modelId="{CFA92978-2C05-4102-9F1E-0EAE00515FAB}" srcId="{D40096CA-2EB7-473A-B5B9-A2A8DDCDCDF5}" destId="{AB39FC06-2E4B-46F3-873F-0A6092D7CE76}" srcOrd="0" destOrd="0" parTransId="{B767DA5F-5E76-494A-B6AF-35C42D4632D7}" sibTransId="{F5F8D5EA-1B5B-4965-ADFB-AE355CA5524E}"/>
+    <dgm:cxn modelId="{9264697F-E52C-49A9-A867-DF2A1ECDC85A}" srcId="{D40096CA-2EB7-473A-B5B9-A2A8DDCDCDF5}" destId="{683AFBFC-8125-4568-B7D1-74E9C680CC3E}" srcOrd="5" destOrd="0" parTransId="{B86E1441-16F9-404A-9FD2-E4B5DCFCD680}" sibTransId="{8D12744F-A4D7-4D6E-A8E8-C4B2B70038E5}"/>
+    <dgm:cxn modelId="{54EC3D86-A9C2-469A-91B9-05AB922E5649}" type="presOf" srcId="{D40096CA-2EB7-473A-B5B9-A2A8DDCDCDF5}" destId="{BBC8C05A-39EA-4813-95B3-64A71489F44A}" srcOrd="0" destOrd="0" presId="urn:microsoft.com/office/officeart/2005/8/layout/default"/>
+    <dgm:cxn modelId="{F4AF68C6-4F81-407D-ABD5-D92B2E691864}" srcId="{D40096CA-2EB7-473A-B5B9-A2A8DDCDCDF5}" destId="{F3EB16DD-1B18-49E4-994F-113FB41EC93C}" srcOrd="1" destOrd="0" parTransId="{0DD1A776-240C-493C-8399-386F3F2ECEF1}" sibTransId="{5EE486AC-594A-4375-B0A9-207A846D53AC}"/>
+    <dgm:cxn modelId="{4A07BFC8-DFF2-4FA8-B7BE-10D3C7774AED}" type="presOf" srcId="{F448D0A8-94A8-461B-8987-DDBA48BEE41B}" destId="{2A250286-4B13-4850-B8A6-C4F2D0762509}" srcOrd="0" destOrd="0" presId="urn:microsoft.com/office/officeart/2005/8/layout/default"/>
+    <dgm:cxn modelId="{E8E0F2CC-D079-4BB1-B04F-A7CBAF5CC0D8}" type="presOf" srcId="{F3EB16DD-1B18-49E4-994F-113FB41EC93C}" destId="{A6129058-4280-4597-A02B-27293ED0231D}" srcOrd="0" destOrd="0" presId="urn:microsoft.com/office/officeart/2005/8/layout/default"/>
+    <dgm:cxn modelId="{1156B4DB-5068-4C2E-850A-BB9F1823624E}" type="presOf" srcId="{23E50043-CFDC-4163-9499-7CC405561DEE}" destId="{532B7FF9-76E8-4A44-B21A-40759E3303F6}" srcOrd="0" destOrd="0" presId="urn:microsoft.com/office/officeart/2005/8/layout/default"/>
+    <dgm:cxn modelId="{D8EACCF9-69FE-405F-B2D7-A9D380AEAC87}" srcId="{D40096CA-2EB7-473A-B5B9-A2A8DDCDCDF5}" destId="{23E50043-CFDC-4163-9499-7CC405561DEE}" srcOrd="4" destOrd="0" parTransId="{366246C8-5213-4DE1-98A7-ABD237702DE5}" sibTransId="{5DA9DA35-E707-43F4-9B29-F611795B0BE2}"/>
+    <dgm:cxn modelId="{08500037-A880-4E1F-A726-CFC8EDD05F66}" type="presParOf" srcId="{BBC8C05A-39EA-4813-95B3-64A71489F44A}" destId="{87F9E8F8-4E6B-4987-BAED-45874AE22D17}" srcOrd="0" destOrd="0" presId="urn:microsoft.com/office/officeart/2005/8/layout/default"/>
+    <dgm:cxn modelId="{DA00AE18-34AE-486E-B0BF-62207E20F7D8}" type="presParOf" srcId="{BBC8C05A-39EA-4813-95B3-64A71489F44A}" destId="{CEB356DE-DF57-48A8-A2DF-A1C71A27F99E}" srcOrd="1" destOrd="0" presId="urn:microsoft.com/office/officeart/2005/8/layout/default"/>
+    <dgm:cxn modelId="{8E9334C1-6030-4F46-B98A-E66AE4A80538}" type="presParOf" srcId="{BBC8C05A-39EA-4813-95B3-64A71489F44A}" destId="{A6129058-4280-4597-A02B-27293ED0231D}" srcOrd="2" destOrd="0" presId="urn:microsoft.com/office/officeart/2005/8/layout/default"/>
+    <dgm:cxn modelId="{8579F3F1-4B58-4AA2-A22D-A39DFDC68A38}" type="presParOf" srcId="{BBC8C05A-39EA-4813-95B3-64A71489F44A}" destId="{49432974-A3B1-4607-9B92-E71519F3B713}" srcOrd="3" destOrd="0" presId="urn:microsoft.com/office/officeart/2005/8/layout/default"/>
+    <dgm:cxn modelId="{35E2C98C-5BDA-4E82-AEFA-BE530BDE0AD1}" type="presParOf" srcId="{BBC8C05A-39EA-4813-95B3-64A71489F44A}" destId="{2A250286-4B13-4850-B8A6-C4F2D0762509}" srcOrd="4" destOrd="0" presId="urn:microsoft.com/office/officeart/2005/8/layout/default"/>
+    <dgm:cxn modelId="{1CBE478D-176E-49EE-B900-572B6093D382}" type="presParOf" srcId="{BBC8C05A-39EA-4813-95B3-64A71489F44A}" destId="{FFCF6A25-E906-44CD-BE82-76E15A876246}" srcOrd="5" destOrd="0" presId="urn:microsoft.com/office/officeart/2005/8/layout/default"/>
+    <dgm:cxn modelId="{821F0771-C26C-4730-91E2-539E6CD736AF}" type="presParOf" srcId="{BBC8C05A-39EA-4813-95B3-64A71489F44A}" destId="{17668B9E-ED61-4A35-BE1B-723901C48B55}" srcOrd="6" destOrd="0" presId="urn:microsoft.com/office/officeart/2005/8/layout/default"/>
+    <dgm:cxn modelId="{A8BB261B-0014-4CAB-AFC1-AF26515F9D8B}" type="presParOf" srcId="{BBC8C05A-39EA-4813-95B3-64A71489F44A}" destId="{31CD4BEF-2981-4779-9DA3-6738F49DAF46}" srcOrd="7" destOrd="0" presId="urn:microsoft.com/office/officeart/2005/8/layout/default"/>
+    <dgm:cxn modelId="{44164477-F19B-483C-8203-7321A00DD24A}" type="presParOf" srcId="{BBC8C05A-39EA-4813-95B3-64A71489F44A}" destId="{532B7FF9-76E8-4A44-B21A-40759E3303F6}" srcOrd="8" destOrd="0" presId="urn:microsoft.com/office/officeart/2005/8/layout/default"/>
+    <dgm:cxn modelId="{26B23E47-E56B-4C7D-B9C0-BF986C4BC909}" type="presParOf" srcId="{BBC8C05A-39EA-4813-95B3-64A71489F44A}" destId="{F06853BD-5747-4E4A-87B4-A1D16B53CFFF}" srcOrd="9" destOrd="0" presId="urn:microsoft.com/office/officeart/2005/8/layout/default"/>
+    <dgm:cxn modelId="{756F42A5-175C-4E43-BF6F-0BF0E88E7E08}" type="presParOf" srcId="{BBC8C05A-39EA-4813-95B3-64A71489F44A}" destId="{9E19E212-BBFA-4C8D-B347-CAC090EED319}" srcOrd="10" destOrd="0" presId="urn:microsoft.com/office/officeart/2005/8/layout/default"/>
+  </dgm:cxnLst>
+  <dgm:bg/>
+  <dgm:whole/>
+  <dgm:extLst>
+    <a:ext uri="http://schemas.microsoft.com/office/drawing/2008/diagram">
+      <dsp:dataModelExt xmlns:dsp="http://schemas.microsoft.com/office/drawing/2008/diagram" relId="rId6" minVer="http://schemas.openxmlformats.org/drawingml/2006/diagram"/>
+    </a:ext>
+  </dgm:extLst>
+</dgm:dataModel>
+</file>
+
+<file path=ppt/diagrams/data3.xml><?xml version="1.0" encoding="utf-8"?>
 <dgm:dataModel xmlns:dgm="http://schemas.openxmlformats.org/drawingml/2006/diagram" xmlns:a="http://schemas.openxmlformats.org/drawingml/2006/main">
   <dgm:ptLst>
     <dgm:pt modelId="{55C5D233-E9C5-439D-A4AE-A75710E09AFA}" type="doc">
@@ -5161,7 +6461,7 @@
 </dgm:dataModel>
 </file>
 
-<file path=ppt/diagrams/data3.xml><?xml version="1.0" encoding="utf-8"?>
+<file path=ppt/diagrams/data4.xml><?xml version="1.0" encoding="utf-8"?>
 <dgm:dataModel xmlns:dgm="http://schemas.openxmlformats.org/drawingml/2006/diagram" xmlns:a="http://schemas.openxmlformats.org/drawingml/2006/main">
   <dgm:ptLst>
     <dgm:pt modelId="{1695D238-0C49-47EB-B255-B3D077BE7930}" type="doc">
@@ -5515,7 +6815,7 @@
 </dgm:dataModel>
 </file>
 
-<file path=ppt/diagrams/data4.xml><?xml version="1.0" encoding="utf-8"?>
+<file path=ppt/diagrams/data5.xml><?xml version="1.0" encoding="utf-8"?>
 <dgm:dataModel xmlns:dgm="http://schemas.openxmlformats.org/drawingml/2006/diagram" xmlns:a="http://schemas.openxmlformats.org/drawingml/2006/main">
   <dgm:ptLst>
     <dgm:pt modelId="{3380AA1B-99ED-4A17-9BF6-3BD70DE24CE3}" type="doc">
@@ -5886,17 +7186,17 @@
       </dgm:t>
     </dgm:pt>
     <dgm:pt modelId="{A81E897E-BD93-46E0-88C2-1EC5C6683634}">
-      <dgm:prSet/>
+      <dgm:prSet custT="1"/>
       <dgm:spPr/>
       <dgm:t>
         <a:bodyPr/>
         <a:lstStyle/>
         <a:p>
           <a:r>
-            <a:rPr lang="en-US" i="1" baseline="0"/>
+            <a:rPr lang="en-US" sz="1600" i="1" baseline="0" dirty="0"/>
             <a:t>After running terraform apply, Terraform displays the output values in the terminal.</a:t>
           </a:r>
-          <a:endParaRPr lang="en-US"/>
+          <a:endParaRPr lang="en-US" sz="1600" dirty="0"/>
         </a:p>
       </dgm:t>
     </dgm:pt>
@@ -5960,17 +7260,17 @@
       </dgm:t>
     </dgm:pt>
     <dgm:pt modelId="{A0A9D49C-0476-4495-B22F-884D9CCF791C}">
-      <dgm:prSet/>
+      <dgm:prSet custT="1"/>
       <dgm:spPr/>
       <dgm:t>
         <a:bodyPr/>
         <a:lstStyle/>
         <a:p>
           <a:r>
-            <a:rPr lang="en-US" i="1" baseline="0"/>
+            <a:rPr lang="en-US" sz="1400" i="1" baseline="0" dirty="0"/>
             <a:t>Outputs can be used as input in other configurations or modules, making them very powerful in larger projects.</a:t>
           </a:r>
-          <a:endParaRPr lang="en-US"/>
+          <a:endParaRPr lang="en-US" sz="1400" dirty="0"/>
         </a:p>
       </dgm:t>
     </dgm:pt>
@@ -6239,11 +7539,11 @@
     <dgm:cxn modelId="{24E9F332-06FF-4F13-9B5B-71D87CC9E335}" type="presOf" srcId="{D9B1925D-9033-49C2-B49E-AF871F4716CF}" destId="{F05F0B38-AA0B-475C-A5E0-9234AEFF1584}" srcOrd="0" destOrd="4" presId="urn:microsoft.com/office/officeart/2018/2/layout/IconVerticalSolidList"/>
     <dgm:cxn modelId="{6D81CD38-6578-4720-BCE0-B1EE415B5641}" srcId="{DE759924-3475-49B8-A784-D36C7309356D}" destId="{44583A67-EDD1-4308-8B43-58FF08295CF6}" srcOrd="0" destOrd="0" parTransId="{12479A2D-598C-4578-A449-6FCBBD2BEEB7}" sibTransId="{444C9418-476F-4ACB-8B61-3539901AB2FE}"/>
     <dgm:cxn modelId="{8D69F039-41A4-4F46-9654-079135C9E1A3}" type="presOf" srcId="{A81E897E-BD93-46E0-88C2-1EC5C6683634}" destId="{33BA7172-32EB-4612-9DB6-318AE5CF505E}" srcOrd="0" destOrd="0" presId="urn:microsoft.com/office/officeart/2018/2/layout/IconVerticalSolidList"/>
+    <dgm:cxn modelId="{D6A6A45F-3DDD-4E1D-81C9-9E0A2AFDD993}" srcId="{3380AA1B-99ED-4A17-9BF6-3BD70DE24CE3}" destId="{DE759924-3475-49B8-A784-D36C7309356D}" srcOrd="1" destOrd="0" parTransId="{47F799F2-C001-4DCB-BB08-C4EB5921879F}" sibTransId="{F319C3C9-89D7-4A81-90C6-F72E802119CB}"/>
+    <dgm:cxn modelId="{9A783461-558F-4C65-91E0-62387AA61B83}" type="presOf" srcId="{6F1AA158-94B8-4286-BA15-AE649F7999A7}" destId="{F05F0B38-AA0B-475C-A5E0-9234AEFF1584}" srcOrd="0" destOrd="1" presId="urn:microsoft.com/office/officeart/2018/2/layout/IconVerticalSolidList"/>
     <dgm:cxn modelId="{6BE6BE4F-C1D0-4FD3-B25B-E0A2F1FEAD06}" srcId="{E2002419-28BE-45FC-903F-BBBD2D00B025}" destId="{A0A9D49C-0476-4495-B22F-884D9CCF791C}" srcOrd="0" destOrd="0" parTransId="{1F44F005-7646-48DD-BFD3-01A9BF69B04E}" sibTransId="{E8DBD713-AAC8-4C2E-A3D8-23A27F9FB320}"/>
     <dgm:cxn modelId="{40708858-1E28-432F-B97B-14B5464465B7}" srcId="{03FD2D41-E574-4057-8685-A8F912B1CB8D}" destId="{A81E897E-BD93-46E0-88C2-1EC5C6683634}" srcOrd="0" destOrd="0" parTransId="{27E1D5F4-7419-4E84-B848-A5FCE3BEE40F}" sibTransId="{E0646003-4F82-4F12-B5A5-785A789CBCF0}"/>
     <dgm:cxn modelId="{A156B258-A322-48F8-A838-3FD0731B3D78}" type="presOf" srcId="{A0A9D49C-0476-4495-B22F-884D9CCF791C}" destId="{F586739E-3713-45F0-9C1D-25782559264C}" srcOrd="0" destOrd="0" presId="urn:microsoft.com/office/officeart/2018/2/layout/IconVerticalSolidList"/>
-    <dgm:cxn modelId="{D6A6A45F-3DDD-4E1D-81C9-9E0A2AFDD993}" srcId="{3380AA1B-99ED-4A17-9BF6-3BD70DE24CE3}" destId="{DE759924-3475-49B8-A784-D36C7309356D}" srcOrd="1" destOrd="0" parTransId="{47F799F2-C001-4DCB-BB08-C4EB5921879F}" sibTransId="{F319C3C9-89D7-4A81-90C6-F72E802119CB}"/>
-    <dgm:cxn modelId="{9A783461-558F-4C65-91E0-62387AA61B83}" type="presOf" srcId="{6F1AA158-94B8-4286-BA15-AE649F7999A7}" destId="{F05F0B38-AA0B-475C-A5E0-9234AEFF1584}" srcOrd="0" destOrd="1" presId="urn:microsoft.com/office/officeart/2018/2/layout/IconVerticalSolidList"/>
     <dgm:cxn modelId="{7AAB9E7E-5081-4A0A-A257-DCB504DC0C8C}" type="presOf" srcId="{CFD3CBFE-4584-49D4-9CDC-B3B8C04BF1AD}" destId="{FF9A7D89-1AD4-4394-BB25-B837CEEFED20}" srcOrd="0" destOrd="0" presId="urn:microsoft.com/office/officeart/2018/2/layout/IconVerticalSolidList"/>
     <dgm:cxn modelId="{54A4188A-5708-41B1-AB30-0D2CB87F3A25}" type="presOf" srcId="{B7FC9511-C288-4858-B5E0-837528C0CD4E}" destId="{F05F0B38-AA0B-475C-A5E0-9234AEFF1584}" srcOrd="0" destOrd="2" presId="urn:microsoft.com/office/officeart/2018/2/layout/IconVerticalSolidList"/>
     <dgm:cxn modelId="{B8962B94-0BE9-42FC-B321-E36ED61E6741}" srcId="{3380AA1B-99ED-4A17-9BF6-3BD70DE24CE3}" destId="{E2002419-28BE-45FC-903F-BBBD2D00B025}" srcOrd="3" destOrd="0" parTransId="{AD3AB395-476A-42E1-9B98-2F6B0110A37F}" sibTransId="{EB75B74D-B870-4C3D-AB56-8BC196A0EF3E}"/>
@@ -6350,12 +7650,12 @@
         </a:fontRef>
       </dsp:style>
       <dsp:txBody>
-        <a:bodyPr spcFirstLastPara="0" vert="horz" wrap="square" lIns="76200" tIns="38100" rIns="76200" bIns="38100" numCol="1" spcCol="1270" anchor="ctr" anchorCtr="0">
+        <a:bodyPr spcFirstLastPara="0" vert="horz" wrap="square" lIns="80010" tIns="40005" rIns="80010" bIns="40005" numCol="1" spcCol="1270" anchor="ctr" anchorCtr="0">
           <a:noAutofit/>
         </a:bodyPr>
         <a:lstStyle/>
         <a:p>
-          <a:pPr marL="0" lvl="0" indent="0" algn="ctr" defTabSz="889000">
+          <a:pPr marL="0" lvl="0" indent="0" algn="ctr" defTabSz="933450">
             <a:lnSpc>
               <a:spcPct val="90000"/>
             </a:lnSpc>
@@ -6369,10 +7669,10 @@
             <a:defRPr b="1"/>
           </a:pPr>
           <a:r>
-            <a:rPr lang="en-US" sz="2000" kern="1200" baseline="0" dirty="0"/>
+            <a:rPr lang="en-US" sz="2100" kern="1200" baseline="0" dirty="0"/>
             <a:t>Why Use Variables?: Variables make Terraform configurations flexible by allowing you to parameterize values.</a:t>
           </a:r>
-          <a:endParaRPr lang="en-US" sz="2000" kern="1200" dirty="0"/>
+          <a:endParaRPr lang="en-US" sz="2100" kern="1200" dirty="0"/>
         </a:p>
       </dsp:txBody>
       <dsp:txXfrm>
@@ -6773,7 +8073,546 @@
         </a:fontRef>
       </dsp:style>
       <dsp:txBody>
-        <a:bodyPr spcFirstLastPara="0" vert="horz" wrap="square" lIns="76200" tIns="38100" rIns="76200" bIns="38100" numCol="1" spcCol="1270" anchor="ctr" anchorCtr="0">
+        <a:bodyPr spcFirstLastPara="0" vert="horz" wrap="square" lIns="80010" tIns="40005" rIns="80010" bIns="40005" numCol="1" spcCol="1270" anchor="ctr" anchorCtr="0">
+          <a:noAutofit/>
+        </a:bodyPr>
+        <a:lstStyle/>
+        <a:p>
+          <a:pPr marL="0" lvl="0" indent="0" algn="ctr" defTabSz="933450">
+            <a:lnSpc>
+              <a:spcPct val="90000"/>
+            </a:lnSpc>
+            <a:spcBef>
+              <a:spcPct val="0"/>
+            </a:spcBef>
+            <a:spcAft>
+              <a:spcPct val="35000"/>
+            </a:spcAft>
+            <a:buNone/>
+            <a:defRPr b="1"/>
+          </a:pPr>
+          <a:r>
+            <a:rPr lang="en-US" sz="2100" kern="1200" baseline="0" dirty="0"/>
+            <a:t>Input Variables:</a:t>
+          </a:r>
+        </a:p>
+        <a:p>
+          <a:pPr marL="0" lvl="0" indent="0" algn="ctr" defTabSz="933450">
+            <a:lnSpc>
+              <a:spcPct val="90000"/>
+            </a:lnSpc>
+            <a:spcBef>
+              <a:spcPct val="0"/>
+            </a:spcBef>
+            <a:spcAft>
+              <a:spcPct val="35000"/>
+            </a:spcAft>
+            <a:buNone/>
+            <a:defRPr b="1"/>
+          </a:pPr>
+          <a:r>
+            <a:rPr lang="en-US" sz="2100" i="1" kern="1200" baseline="0" dirty="0"/>
+            <a:t>Variables allow for dynamic inputs in configurations, so you don’t have to hardcode values.</a:t>
+          </a:r>
+          <a:endParaRPr lang="en-US" sz="2100" kern="1200" dirty="0"/>
+        </a:p>
+        <a:p>
+          <a:pPr marL="0" lvl="0" indent="0" algn="ctr" defTabSz="933450">
+            <a:lnSpc>
+              <a:spcPct val="90000"/>
+            </a:lnSpc>
+            <a:spcBef>
+              <a:spcPct val="0"/>
+            </a:spcBef>
+            <a:spcAft>
+              <a:spcPct val="35000"/>
+            </a:spcAft>
+            <a:buNone/>
+          </a:pPr>
+          <a:r>
+            <a:rPr lang="en-US" sz="2100" i="1" kern="1200" baseline="0" dirty="0"/>
+            <a:t>Example below</a:t>
+          </a:r>
+          <a:endParaRPr lang="en-US" sz="2100" kern="1200" dirty="0"/>
+        </a:p>
+      </dsp:txBody>
+      <dsp:txXfrm>
+        <a:off x="5047176" y="176347"/>
+        <a:ext cx="3304041" cy="2193967"/>
+      </dsp:txXfrm>
+    </dsp:sp>
+  </dsp:spTree>
+</dsp:drawing>
+</file>
+
+<file path=ppt/diagrams/drawing2.xml><?xml version="1.0" encoding="utf-8"?>
+<dsp:drawing xmlns:dgm="http://schemas.openxmlformats.org/drawingml/2006/diagram" xmlns:dsp="http://schemas.microsoft.com/office/drawing/2008/diagram" xmlns:a="http://schemas.openxmlformats.org/drawingml/2006/main">
+  <dsp:spTree>
+    <dsp:nvGrpSpPr>
+      <dsp:cNvPr id="0" name=""/>
+      <dsp:cNvGrpSpPr/>
+    </dsp:nvGrpSpPr>
+    <dsp:grpSpPr/>
+    <dsp:sp modelId="{87F9E8F8-4E6B-4987-BAED-45874AE22D17}">
+      <dsp:nvSpPr>
+        <dsp:cNvPr id="0" name=""/>
+        <dsp:cNvSpPr/>
+      </dsp:nvSpPr>
+      <dsp:spPr>
+        <a:xfrm>
+          <a:off x="397549" y="1960"/>
+          <a:ext cx="2751906" cy="1651143"/>
+        </a:xfrm>
+        <a:prstGeom prst="rect">
+          <a:avLst/>
+        </a:prstGeom>
+        <a:solidFill>
+          <a:schemeClr val="accent2">
+            <a:hueOff val="0"/>
+            <a:satOff val="0"/>
+            <a:lumOff val="0"/>
+            <a:alphaOff val="0"/>
+          </a:schemeClr>
+        </a:solidFill>
+        <a:ln w="34925" cap="flat" cmpd="sng" algn="in">
+          <a:solidFill>
+            <a:schemeClr val="lt1">
+              <a:hueOff val="0"/>
+              <a:satOff val="0"/>
+              <a:lumOff val="0"/>
+              <a:alphaOff val="0"/>
+            </a:schemeClr>
+          </a:solidFill>
+          <a:prstDash val="solid"/>
+        </a:ln>
+        <a:effectLst/>
+      </dsp:spPr>
+      <dsp:style>
+        <a:lnRef idx="2">
+          <a:scrgbClr r="0" g="0" b="0"/>
+        </a:lnRef>
+        <a:fillRef idx="1">
+          <a:scrgbClr r="0" g="0" b="0"/>
+        </a:fillRef>
+        <a:effectRef idx="0">
+          <a:scrgbClr r="0" g="0" b="0"/>
+        </a:effectRef>
+        <a:fontRef idx="minor">
+          <a:schemeClr val="lt1"/>
+        </a:fontRef>
+      </dsp:style>
+      <dsp:txBody>
+        <a:bodyPr spcFirstLastPara="0" vert="horz" wrap="square" lIns="106680" tIns="106680" rIns="106680" bIns="106680" numCol="1" spcCol="1270" anchor="ctr" anchorCtr="0">
+          <a:noAutofit/>
+        </a:bodyPr>
+        <a:lstStyle/>
+        <a:p>
+          <a:pPr marL="0" lvl="0" indent="0" algn="ctr" defTabSz="1244600">
+            <a:lnSpc>
+              <a:spcPct val="90000"/>
+            </a:lnSpc>
+            <a:spcBef>
+              <a:spcPct val="0"/>
+            </a:spcBef>
+            <a:spcAft>
+              <a:spcPct val="35000"/>
+            </a:spcAft>
+            <a:buNone/>
+          </a:pPr>
+          <a:r>
+            <a:rPr lang="en-US" sz="2800" b="1" kern="1200" baseline="0" dirty="0"/>
+            <a:t>string</a:t>
+          </a:r>
+          <a:r>
+            <a:rPr lang="en-US" sz="1700" kern="1200" baseline="0" dirty="0"/>
+            <a:t>: a sequence of Unicode characters representing some text, like "hello".</a:t>
+          </a:r>
+          <a:endParaRPr lang="en-US" sz="1700" kern="1200" dirty="0"/>
+        </a:p>
+      </dsp:txBody>
+      <dsp:txXfrm>
+        <a:off x="397549" y="1960"/>
+        <a:ext cx="2751906" cy="1651143"/>
+      </dsp:txXfrm>
+    </dsp:sp>
+    <dsp:sp modelId="{A6129058-4280-4597-A02B-27293ED0231D}">
+      <dsp:nvSpPr>
+        <dsp:cNvPr id="0" name=""/>
+        <dsp:cNvSpPr/>
+      </dsp:nvSpPr>
+      <dsp:spPr>
+        <a:xfrm>
+          <a:off x="3424646" y="1960"/>
+          <a:ext cx="2751906" cy="1651143"/>
+        </a:xfrm>
+        <a:prstGeom prst="rect">
+          <a:avLst/>
+        </a:prstGeom>
+        <a:solidFill>
+          <a:schemeClr val="accent3">
+            <a:hueOff val="0"/>
+            <a:satOff val="0"/>
+            <a:lumOff val="0"/>
+            <a:alphaOff val="0"/>
+          </a:schemeClr>
+        </a:solidFill>
+        <a:ln w="34925" cap="flat" cmpd="sng" algn="in">
+          <a:solidFill>
+            <a:schemeClr val="lt1">
+              <a:hueOff val="0"/>
+              <a:satOff val="0"/>
+              <a:lumOff val="0"/>
+              <a:alphaOff val="0"/>
+            </a:schemeClr>
+          </a:solidFill>
+          <a:prstDash val="solid"/>
+        </a:ln>
+        <a:effectLst/>
+      </dsp:spPr>
+      <dsp:style>
+        <a:lnRef idx="2">
+          <a:scrgbClr r="0" g="0" b="0"/>
+        </a:lnRef>
+        <a:fillRef idx="1">
+          <a:scrgbClr r="0" g="0" b="0"/>
+        </a:fillRef>
+        <a:effectRef idx="0">
+          <a:scrgbClr r="0" g="0" b="0"/>
+        </a:effectRef>
+        <a:fontRef idx="minor">
+          <a:schemeClr val="lt1"/>
+        </a:fontRef>
+      </dsp:style>
+      <dsp:txBody>
+        <a:bodyPr spcFirstLastPara="0" vert="horz" wrap="square" lIns="91440" tIns="91440" rIns="91440" bIns="91440" numCol="1" spcCol="1270" anchor="ctr" anchorCtr="0">
+          <a:noAutofit/>
+        </a:bodyPr>
+        <a:lstStyle/>
+        <a:p>
+          <a:pPr marL="0" lvl="0" indent="0" algn="ctr" defTabSz="1066800">
+            <a:lnSpc>
+              <a:spcPct val="90000"/>
+            </a:lnSpc>
+            <a:spcBef>
+              <a:spcPct val="0"/>
+            </a:spcBef>
+            <a:spcAft>
+              <a:spcPct val="35000"/>
+            </a:spcAft>
+            <a:buNone/>
+          </a:pPr>
+          <a:r>
+            <a:rPr lang="en-US" sz="2400" b="1" kern="1200" baseline="0" dirty="0"/>
+            <a:t>number</a:t>
+          </a:r>
+          <a:r>
+            <a:rPr lang="en-US" sz="1700" kern="1200" baseline="0" dirty="0"/>
+            <a:t>: a numeric value. The number type can represent both whole numbers like 15 and fractional values like 6.283185.</a:t>
+          </a:r>
+          <a:endParaRPr lang="en-US" sz="1700" kern="1200" dirty="0"/>
+        </a:p>
+      </dsp:txBody>
+      <dsp:txXfrm>
+        <a:off x="3424646" y="1960"/>
+        <a:ext cx="2751906" cy="1651143"/>
+      </dsp:txXfrm>
+    </dsp:sp>
+    <dsp:sp modelId="{2A250286-4B13-4850-B8A6-C4F2D0762509}">
+      <dsp:nvSpPr>
+        <dsp:cNvPr id="0" name=""/>
+        <dsp:cNvSpPr/>
+      </dsp:nvSpPr>
+      <dsp:spPr>
+        <a:xfrm>
+          <a:off x="6451743" y="1960"/>
+          <a:ext cx="2751906" cy="1651143"/>
+        </a:xfrm>
+        <a:prstGeom prst="rect">
+          <a:avLst/>
+        </a:prstGeom>
+        <a:solidFill>
+          <a:schemeClr val="accent4">
+            <a:hueOff val="0"/>
+            <a:satOff val="0"/>
+            <a:lumOff val="0"/>
+            <a:alphaOff val="0"/>
+          </a:schemeClr>
+        </a:solidFill>
+        <a:ln w="34925" cap="flat" cmpd="sng" algn="in">
+          <a:solidFill>
+            <a:schemeClr val="lt1">
+              <a:hueOff val="0"/>
+              <a:satOff val="0"/>
+              <a:lumOff val="0"/>
+              <a:alphaOff val="0"/>
+            </a:schemeClr>
+          </a:solidFill>
+          <a:prstDash val="solid"/>
+        </a:ln>
+        <a:effectLst/>
+      </dsp:spPr>
+      <dsp:style>
+        <a:lnRef idx="2">
+          <a:scrgbClr r="0" g="0" b="0"/>
+        </a:lnRef>
+        <a:fillRef idx="1">
+          <a:scrgbClr r="0" g="0" b="0"/>
+        </a:fillRef>
+        <a:effectRef idx="0">
+          <a:scrgbClr r="0" g="0" b="0"/>
+        </a:effectRef>
+        <a:fontRef idx="minor">
+          <a:schemeClr val="lt1"/>
+        </a:fontRef>
+      </dsp:style>
+      <dsp:txBody>
+        <a:bodyPr spcFirstLastPara="0" vert="horz" wrap="square" lIns="91440" tIns="91440" rIns="91440" bIns="91440" numCol="1" spcCol="1270" anchor="ctr" anchorCtr="0">
+          <a:noAutofit/>
+        </a:bodyPr>
+        <a:lstStyle/>
+        <a:p>
+          <a:pPr marL="0" lvl="0" indent="0" algn="ctr" defTabSz="1066800">
+            <a:lnSpc>
+              <a:spcPct val="90000"/>
+            </a:lnSpc>
+            <a:spcBef>
+              <a:spcPct val="0"/>
+            </a:spcBef>
+            <a:spcAft>
+              <a:spcPct val="35000"/>
+            </a:spcAft>
+            <a:buNone/>
+          </a:pPr>
+          <a:r>
+            <a:rPr lang="en-US" sz="2400" b="1" kern="1200" baseline="0" dirty="0"/>
+            <a:t>bool</a:t>
+          </a:r>
+          <a:r>
+            <a:rPr lang="en-US" sz="1700" kern="1200" baseline="0" dirty="0"/>
+            <a:t>: a boolean value, either true or false. bool values can be used in conditional logic.</a:t>
+          </a:r>
+          <a:endParaRPr lang="en-US" sz="1700" kern="1200" dirty="0"/>
+        </a:p>
+      </dsp:txBody>
+      <dsp:txXfrm>
+        <a:off x="6451743" y="1960"/>
+        <a:ext cx="2751906" cy="1651143"/>
+      </dsp:txXfrm>
+    </dsp:sp>
+    <dsp:sp modelId="{17668B9E-ED61-4A35-BE1B-723901C48B55}">
+      <dsp:nvSpPr>
+        <dsp:cNvPr id="0" name=""/>
+        <dsp:cNvSpPr/>
+      </dsp:nvSpPr>
+      <dsp:spPr>
+        <a:xfrm>
+          <a:off x="397549" y="1928295"/>
+          <a:ext cx="2751906" cy="1651143"/>
+        </a:xfrm>
+        <a:prstGeom prst="rect">
+          <a:avLst/>
+        </a:prstGeom>
+        <a:solidFill>
+          <a:schemeClr val="accent5">
+            <a:hueOff val="0"/>
+            <a:satOff val="0"/>
+            <a:lumOff val="0"/>
+            <a:alphaOff val="0"/>
+          </a:schemeClr>
+        </a:solidFill>
+        <a:ln w="34925" cap="flat" cmpd="sng" algn="in">
+          <a:solidFill>
+            <a:schemeClr val="lt1">
+              <a:hueOff val="0"/>
+              <a:satOff val="0"/>
+              <a:lumOff val="0"/>
+              <a:alphaOff val="0"/>
+            </a:schemeClr>
+          </a:solidFill>
+          <a:prstDash val="solid"/>
+        </a:ln>
+        <a:effectLst/>
+      </dsp:spPr>
+      <dsp:style>
+        <a:lnRef idx="2">
+          <a:scrgbClr r="0" g="0" b="0"/>
+        </a:lnRef>
+        <a:fillRef idx="1">
+          <a:scrgbClr r="0" g="0" b="0"/>
+        </a:fillRef>
+        <a:effectRef idx="0">
+          <a:scrgbClr r="0" g="0" b="0"/>
+        </a:effectRef>
+        <a:fontRef idx="minor">
+          <a:schemeClr val="lt1"/>
+        </a:fontRef>
+      </dsp:style>
+      <dsp:txBody>
+        <a:bodyPr spcFirstLastPara="0" vert="horz" wrap="square" lIns="91440" tIns="91440" rIns="91440" bIns="91440" numCol="1" spcCol="1270" anchor="ctr" anchorCtr="0">
+          <a:noAutofit/>
+        </a:bodyPr>
+        <a:lstStyle/>
+        <a:p>
+          <a:pPr marL="0" lvl="0" indent="0" algn="ctr" defTabSz="1066800">
+            <a:lnSpc>
+              <a:spcPct val="90000"/>
+            </a:lnSpc>
+            <a:spcBef>
+              <a:spcPct val="0"/>
+            </a:spcBef>
+            <a:spcAft>
+              <a:spcPct val="35000"/>
+            </a:spcAft>
+            <a:buNone/>
+          </a:pPr>
+          <a:r>
+            <a:rPr lang="en-US" sz="2400" b="1" kern="1200" baseline="0" dirty="0"/>
+            <a:t>list</a:t>
+          </a:r>
+          <a:r>
+            <a:rPr lang="en-US" sz="1700" kern="1200" baseline="0" dirty="0"/>
+            <a:t>: a sequence of values, like ["us-west-1a", "us-west-1c"]. Identify elements in a list with consecutive whole numbers, starting with zero.</a:t>
+          </a:r>
+          <a:endParaRPr lang="en-US" sz="1700" kern="1200" dirty="0"/>
+        </a:p>
+      </dsp:txBody>
+      <dsp:txXfrm>
+        <a:off x="397549" y="1928295"/>
+        <a:ext cx="2751906" cy="1651143"/>
+      </dsp:txXfrm>
+    </dsp:sp>
+    <dsp:sp modelId="{532B7FF9-76E8-4A44-B21A-40759E3303F6}">
+      <dsp:nvSpPr>
+        <dsp:cNvPr id="0" name=""/>
+        <dsp:cNvSpPr/>
+      </dsp:nvSpPr>
+      <dsp:spPr>
+        <a:xfrm>
+          <a:off x="3424646" y="1928295"/>
+          <a:ext cx="2751906" cy="1651143"/>
+        </a:xfrm>
+        <a:prstGeom prst="rect">
+          <a:avLst/>
+        </a:prstGeom>
+        <a:solidFill>
+          <a:schemeClr val="accent6">
+            <a:hueOff val="0"/>
+            <a:satOff val="0"/>
+            <a:lumOff val="0"/>
+            <a:alphaOff val="0"/>
+          </a:schemeClr>
+        </a:solidFill>
+        <a:ln w="34925" cap="flat" cmpd="sng" algn="in">
+          <a:solidFill>
+            <a:schemeClr val="lt1">
+              <a:hueOff val="0"/>
+              <a:satOff val="0"/>
+              <a:lumOff val="0"/>
+              <a:alphaOff val="0"/>
+            </a:schemeClr>
+          </a:solidFill>
+          <a:prstDash val="solid"/>
+        </a:ln>
+        <a:effectLst/>
+      </dsp:spPr>
+      <dsp:style>
+        <a:lnRef idx="2">
+          <a:scrgbClr r="0" g="0" b="0"/>
+        </a:lnRef>
+        <a:fillRef idx="1">
+          <a:scrgbClr r="0" g="0" b="0"/>
+        </a:fillRef>
+        <a:effectRef idx="0">
+          <a:scrgbClr r="0" g="0" b="0"/>
+        </a:effectRef>
+        <a:fontRef idx="minor">
+          <a:schemeClr val="lt1"/>
+        </a:fontRef>
+      </dsp:style>
+      <dsp:txBody>
+        <a:bodyPr spcFirstLastPara="0" vert="horz" wrap="square" lIns="106680" tIns="106680" rIns="106680" bIns="106680" numCol="1" spcCol="1270" anchor="ctr" anchorCtr="0">
+          <a:noAutofit/>
+        </a:bodyPr>
+        <a:lstStyle/>
+        <a:p>
+          <a:pPr marL="0" lvl="0" indent="0" algn="ctr" defTabSz="1244600">
+            <a:lnSpc>
+              <a:spcPct val="90000"/>
+            </a:lnSpc>
+            <a:spcBef>
+              <a:spcPct val="0"/>
+            </a:spcBef>
+            <a:spcAft>
+              <a:spcPct val="35000"/>
+            </a:spcAft>
+            <a:buNone/>
+          </a:pPr>
+          <a:r>
+            <a:rPr lang="en-US" sz="2800" b="1" kern="1200" baseline="0" dirty="0"/>
+            <a:t>set</a:t>
+          </a:r>
+          <a:r>
+            <a:rPr lang="en-US" sz="2000" kern="1200" baseline="0" dirty="0"/>
+            <a:t>: a collection of unique values that do not have any secondary identifiers or ordering.</a:t>
+          </a:r>
+          <a:endParaRPr lang="en-US" sz="2000" kern="1200" dirty="0"/>
+        </a:p>
+      </dsp:txBody>
+      <dsp:txXfrm>
+        <a:off x="3424646" y="1928295"/>
+        <a:ext cx="2751906" cy="1651143"/>
+      </dsp:txXfrm>
+    </dsp:sp>
+    <dsp:sp modelId="{9E19E212-BBFA-4C8D-B347-CAC090EED319}">
+      <dsp:nvSpPr>
+        <dsp:cNvPr id="0" name=""/>
+        <dsp:cNvSpPr/>
+      </dsp:nvSpPr>
+      <dsp:spPr>
+        <a:xfrm>
+          <a:off x="6451743" y="1928295"/>
+          <a:ext cx="2751906" cy="1651143"/>
+        </a:xfrm>
+        <a:prstGeom prst="rect">
+          <a:avLst/>
+        </a:prstGeom>
+        <a:solidFill>
+          <a:schemeClr val="accent2">
+            <a:hueOff val="0"/>
+            <a:satOff val="0"/>
+            <a:lumOff val="0"/>
+            <a:alphaOff val="0"/>
+          </a:schemeClr>
+        </a:solidFill>
+        <a:ln w="34925" cap="flat" cmpd="sng" algn="in">
+          <a:solidFill>
+            <a:schemeClr val="lt1">
+              <a:hueOff val="0"/>
+              <a:satOff val="0"/>
+              <a:lumOff val="0"/>
+              <a:alphaOff val="0"/>
+            </a:schemeClr>
+          </a:solidFill>
+          <a:prstDash val="solid"/>
+        </a:ln>
+        <a:effectLst/>
+      </dsp:spPr>
+      <dsp:style>
+        <a:lnRef idx="2">
+          <a:scrgbClr r="0" g="0" b="0"/>
+        </a:lnRef>
+        <a:fillRef idx="1">
+          <a:scrgbClr r="0" g="0" b="0"/>
+        </a:fillRef>
+        <a:effectRef idx="0">
+          <a:scrgbClr r="0" g="0" b="0"/>
+        </a:effectRef>
+        <a:fontRef idx="minor">
+          <a:schemeClr val="lt1"/>
+        </a:fontRef>
+      </dsp:style>
+      <dsp:txBody>
+        <a:bodyPr spcFirstLastPara="0" vert="horz" wrap="square" lIns="76200" tIns="76200" rIns="76200" bIns="76200" numCol="1" spcCol="1270" anchor="ctr" anchorCtr="0">
           <a:noAutofit/>
         </a:bodyPr>
         <a:lstStyle/>
@@ -6789,32 +8628,15 @@
               <a:spcPct val="35000"/>
             </a:spcAft>
             <a:buNone/>
-            <a:defRPr b="1"/>
           </a:pPr>
           <a:r>
+            <a:rPr lang="en-US" sz="2000" b="1" kern="1200" baseline="0" dirty="0"/>
+            <a:t>map (or object)</a:t>
+          </a:r>
+          <a:r>
             <a:rPr lang="en-US" sz="2000" kern="1200" baseline="0" dirty="0"/>
-            <a:t>Input Variables:</a:t>
+            <a:t>: a group of values identified by named labels, like </a:t>
           </a:r>
-        </a:p>
-        <a:p>
-          <a:pPr marL="0" lvl="0" indent="0" algn="ctr" defTabSz="889000">
-            <a:lnSpc>
-              <a:spcPct val="90000"/>
-            </a:lnSpc>
-            <a:spcBef>
-              <a:spcPct val="0"/>
-            </a:spcBef>
-            <a:spcAft>
-              <a:spcPct val="35000"/>
-            </a:spcAft>
-            <a:buNone/>
-            <a:defRPr b="1"/>
-          </a:pPr>
-          <a:r>
-            <a:rPr lang="en-US" sz="2000" i="1" kern="1200" baseline="0" dirty="0"/>
-            <a:t>Variables allow for dynamic inputs in configurations, so you don’t have to hardcode values.</a:t>
-          </a:r>
-          <a:endParaRPr lang="en-US" sz="2000" kern="1200" dirty="0"/>
         </a:p>
         <a:p>
           <a:pPr marL="0" lvl="0" indent="0" algn="ctr" defTabSz="889000">
@@ -6830,22 +8652,22 @@
             <a:buNone/>
           </a:pPr>
           <a:r>
-            <a:rPr lang="en-US" sz="2000" i="1" kern="1200" baseline="0" dirty="0"/>
-            <a:t>Example below</a:t>
+            <a:rPr lang="en-US" sz="2000" kern="1200" baseline="0" dirty="0"/>
+            <a:t>{name = "Mabel", age = 52}.</a:t>
           </a:r>
           <a:endParaRPr lang="en-US" sz="2000" kern="1200" dirty="0"/>
         </a:p>
       </dsp:txBody>
       <dsp:txXfrm>
-        <a:off x="5047176" y="176347"/>
-        <a:ext cx="3304041" cy="2193967"/>
+        <a:off x="6451743" y="1928295"/>
+        <a:ext cx="2751906" cy="1651143"/>
       </dsp:txXfrm>
     </dsp:sp>
   </dsp:spTree>
 </dsp:drawing>
 </file>
 
-<file path=ppt/diagrams/drawing2.xml><?xml version="1.0" encoding="utf-8"?>
+<file path=ppt/diagrams/drawing3.xml><?xml version="1.0" encoding="utf-8"?>
 <dsp:drawing xmlns:dgm="http://schemas.openxmlformats.org/drawingml/2006/diagram" xmlns:dsp="http://schemas.microsoft.com/office/drawing/2008/diagram" xmlns:a="http://schemas.openxmlformats.org/drawingml/2006/main">
   <dsp:spTree>
     <dsp:nvGrpSpPr>
@@ -6946,7 +8768,7 @@
         </a:bodyPr>
         <a:lstStyle/>
         <a:p>
-          <a:pPr marL="0" lvl="0" indent="0" algn="ctr" defTabSz="1244600">
+          <a:pPr marL="0" lvl="0" indent="0" algn="ctr" defTabSz="1333500">
             <a:lnSpc>
               <a:spcPct val="100000"/>
             </a:lnSpc>
@@ -6960,10 +8782,10 @@
             <a:defRPr b="1"/>
           </a:pPr>
           <a:r>
-            <a:rPr lang="en-US" sz="2800" kern="1200" baseline="0"/>
+            <a:rPr lang="en-US" sz="3000" kern="1200" baseline="0"/>
             <a:t>Separate Variable Files:</a:t>
           </a:r>
-          <a:endParaRPr lang="en-US" sz="2800" kern="1200"/>
+          <a:endParaRPr lang="en-US" sz="3000" kern="1200"/>
         </a:p>
       </dsp:txBody>
       <dsp:txXfrm>
@@ -7247,7 +9069,7 @@
         </a:bodyPr>
         <a:lstStyle/>
         <a:p>
-          <a:pPr marL="0" lvl="0" indent="0" algn="ctr" defTabSz="1244600">
+          <a:pPr marL="0" lvl="0" indent="0" algn="ctr" defTabSz="1333500">
             <a:lnSpc>
               <a:spcPct val="100000"/>
             </a:lnSpc>
@@ -7261,10 +9083,10 @@
             <a:defRPr b="1"/>
           </a:pPr>
           <a:r>
-            <a:rPr lang="en-US" sz="2800" kern="1200" baseline="0"/>
+            <a:rPr lang="en-US" sz="3000" kern="1200" baseline="0"/>
             <a:t>Loading Variable Files:</a:t>
           </a:r>
-          <a:endParaRPr lang="en-US" sz="2800" kern="1200"/>
+          <a:endParaRPr lang="en-US" sz="3000" kern="1200"/>
         </a:p>
       </dsp:txBody>
       <dsp:txXfrm>
@@ -7431,7 +9253,7 @@
 </dsp:drawing>
 </file>
 
-<file path=ppt/diagrams/drawing3.xml><?xml version="1.0" encoding="utf-8"?>
+<file path=ppt/diagrams/drawing4.xml><?xml version="1.0" encoding="utf-8"?>
 <dsp:drawing xmlns:dgm="http://schemas.openxmlformats.org/drawingml/2006/diagram" xmlns:dsp="http://schemas.microsoft.com/office/drawing/2008/diagram" xmlns:a="http://schemas.openxmlformats.org/drawingml/2006/main">
   <dsp:spTree>
     <dsp:nvGrpSpPr>
@@ -7784,7 +9606,7 @@
 </dsp:drawing>
 </file>
 
-<file path=ppt/diagrams/drawing4.xml><?xml version="1.0" encoding="utf-8"?>
+<file path=ppt/diagrams/drawing5.xml><?xml version="1.0" encoding="utf-8"?>
 <dsp:drawing xmlns:dgm="http://schemas.openxmlformats.org/drawingml/2006/diagram" xmlns:dsp="http://schemas.microsoft.com/office/drawing/2008/diagram" xmlns:a="http://schemas.openxmlformats.org/drawingml/2006/main">
   <dsp:spTree>
     <dsp:nvGrpSpPr>
@@ -8464,7 +10286,7 @@
         </a:bodyPr>
         <a:lstStyle/>
         <a:p>
-          <a:pPr marL="0" lvl="0" indent="0" algn="l" defTabSz="488950">
+          <a:pPr marL="0" lvl="0" indent="0" algn="l" defTabSz="711200">
             <a:lnSpc>
               <a:spcPct val="90000"/>
             </a:lnSpc>
@@ -8477,10 +10299,10 @@
             <a:buNone/>
           </a:pPr>
           <a:r>
-            <a:rPr lang="en-US" sz="1100" i="1" kern="1200" baseline="0"/>
+            <a:rPr lang="en-US" sz="1600" i="1" kern="1200" baseline="0" dirty="0"/>
             <a:t>After running terraform apply, Terraform displays the output values in the terminal.</a:t>
           </a:r>
-          <a:endParaRPr lang="en-US" sz="1100" kern="1200"/>
+          <a:endParaRPr lang="en-US" sz="1600" kern="1200" dirty="0"/>
         </a:p>
       </dsp:txBody>
       <dsp:txXfrm>
@@ -8676,7 +10498,7 @@
         </a:bodyPr>
         <a:lstStyle/>
         <a:p>
-          <a:pPr marL="0" lvl="0" indent="0" algn="l" defTabSz="488950">
+          <a:pPr marL="0" lvl="0" indent="0" algn="l" defTabSz="622300">
             <a:lnSpc>
               <a:spcPct val="90000"/>
             </a:lnSpc>
@@ -8689,10 +10511,10 @@
             <a:buNone/>
           </a:pPr>
           <a:r>
-            <a:rPr lang="en-US" sz="1100" i="1" kern="1200" baseline="0"/>
+            <a:rPr lang="en-US" sz="1400" i="1" kern="1200" baseline="0" dirty="0"/>
             <a:t>Outputs can be used as input in other configurations or modules, making them very powerful in larger projects.</a:t>
           </a:r>
-          <a:endParaRPr lang="en-US" sz="1100" kern="1200"/>
+          <a:endParaRPr lang="en-US" sz="1400" kern="1200" dirty="0"/>
         </a:p>
       </dsp:txBody>
       <dsp:txXfrm>
@@ -8938,6 +10760,153 @@
 </file>
 
 <file path=ppt/diagrams/layout2.xml><?xml version="1.0" encoding="utf-8"?>
+<dgm:layoutDef xmlns:dgm="http://schemas.openxmlformats.org/drawingml/2006/diagram" xmlns:a="http://schemas.openxmlformats.org/drawingml/2006/main" uniqueId="urn:microsoft.com/office/officeart/2005/8/layout/default">
+  <dgm:title val=""/>
+  <dgm:desc val=""/>
+  <dgm:catLst>
+    <dgm:cat type="list" pri="400"/>
+  </dgm:catLst>
+  <dgm:sampData>
+    <dgm:dataModel>
+      <dgm:ptLst>
+        <dgm:pt modelId="0" type="doc"/>
+        <dgm:pt modelId="1">
+          <dgm:prSet phldr="1"/>
+        </dgm:pt>
+        <dgm:pt modelId="2">
+          <dgm:prSet phldr="1"/>
+        </dgm:pt>
+        <dgm:pt modelId="3">
+          <dgm:prSet phldr="1"/>
+        </dgm:pt>
+        <dgm:pt modelId="4">
+          <dgm:prSet phldr="1"/>
+        </dgm:pt>
+        <dgm:pt modelId="5">
+          <dgm:prSet phldr="1"/>
+        </dgm:pt>
+      </dgm:ptLst>
+      <dgm:cxnLst>
+        <dgm:cxn modelId="6" srcId="0" destId="1" srcOrd="0" destOrd="0"/>
+        <dgm:cxn modelId="7" srcId="0" destId="2" srcOrd="1" destOrd="0"/>
+        <dgm:cxn modelId="8" srcId="0" destId="3" srcOrd="2" destOrd="0"/>
+        <dgm:cxn modelId="9" srcId="0" destId="4" srcOrd="3" destOrd="0"/>
+        <dgm:cxn modelId="10" srcId="0" destId="5" srcOrd="4" destOrd="0"/>
+      </dgm:cxnLst>
+      <dgm:bg/>
+      <dgm:whole/>
+    </dgm:dataModel>
+  </dgm:sampData>
+  <dgm:styleData>
+    <dgm:dataModel>
+      <dgm:ptLst>
+        <dgm:pt modelId="0" type="doc"/>
+        <dgm:pt modelId="1"/>
+        <dgm:pt modelId="2"/>
+      </dgm:ptLst>
+      <dgm:cxnLst>
+        <dgm:cxn modelId="3" srcId="0" destId="1" srcOrd="0" destOrd="0"/>
+        <dgm:cxn modelId="4" srcId="0" destId="2" srcOrd="1" destOrd="0"/>
+      </dgm:cxnLst>
+      <dgm:bg/>
+      <dgm:whole/>
+    </dgm:dataModel>
+  </dgm:styleData>
+  <dgm:clrData>
+    <dgm:dataModel>
+      <dgm:ptLst>
+        <dgm:pt modelId="0" type="doc"/>
+        <dgm:pt modelId="1"/>
+        <dgm:pt modelId="2"/>
+        <dgm:pt modelId="3"/>
+        <dgm:pt modelId="4"/>
+        <dgm:pt modelId="5"/>
+        <dgm:pt modelId="6"/>
+      </dgm:ptLst>
+      <dgm:cxnLst>
+        <dgm:cxn modelId="7" srcId="0" destId="1" srcOrd="0" destOrd="0"/>
+        <dgm:cxn modelId="8" srcId="0" destId="2" srcOrd="1" destOrd="0"/>
+        <dgm:cxn modelId="9" srcId="0" destId="3" srcOrd="2" destOrd="0"/>
+        <dgm:cxn modelId="10" srcId="0" destId="4" srcOrd="3" destOrd="0"/>
+        <dgm:cxn modelId="11" srcId="0" destId="5" srcOrd="4" destOrd="0"/>
+        <dgm:cxn modelId="12" srcId="0" destId="6" srcOrd="5" destOrd="0"/>
+      </dgm:cxnLst>
+      <dgm:bg/>
+      <dgm:whole/>
+    </dgm:dataModel>
+  </dgm:clrData>
+  <dgm:layoutNode name="diagram">
+    <dgm:varLst>
+      <dgm:dir/>
+      <dgm:resizeHandles val="exact"/>
+    </dgm:varLst>
+    <dgm:choose name="Name0">
+      <dgm:if name="Name1" func="var" arg="dir" op="equ" val="norm">
+        <dgm:alg type="snake">
+          <dgm:param type="grDir" val="tL"/>
+          <dgm:param type="flowDir" val="row"/>
+          <dgm:param type="contDir" val="sameDir"/>
+          <dgm:param type="off" val="ctr"/>
+        </dgm:alg>
+      </dgm:if>
+      <dgm:else name="Name2">
+        <dgm:alg type="snake">
+          <dgm:param type="grDir" val="tR"/>
+          <dgm:param type="flowDir" val="row"/>
+          <dgm:param type="contDir" val="sameDir"/>
+          <dgm:param type="off" val="ctr"/>
+        </dgm:alg>
+      </dgm:else>
+    </dgm:choose>
+    <dgm:shape xmlns:r="http://schemas.openxmlformats.org/officeDocument/2006/relationships" r:blip="">
+      <dgm:adjLst/>
+    </dgm:shape>
+    <dgm:presOf/>
+    <dgm:constrLst>
+      <dgm:constr type="w" for="ch" forName="node" refType="w"/>
+      <dgm:constr type="h" for="ch" forName="node" refType="w" refFor="ch" refForName="node" fact="0.6"/>
+      <dgm:constr type="w" for="ch" forName="sibTrans" refType="w" refFor="ch" refForName="node" fact="0.1"/>
+      <dgm:constr type="sp" refType="w" refFor="ch" refForName="sibTrans"/>
+      <dgm:constr type="primFontSz" for="ch" forName="node" op="equ" val="65"/>
+    </dgm:constrLst>
+    <dgm:ruleLst/>
+    <dgm:forEach name="Name3" axis="ch" ptType="node">
+      <dgm:layoutNode name="node">
+        <dgm:varLst>
+          <dgm:bulletEnabled val="1"/>
+        </dgm:varLst>
+        <dgm:alg type="tx"/>
+        <dgm:shape xmlns:r="http://schemas.openxmlformats.org/officeDocument/2006/relationships" type="rect" r:blip="">
+          <dgm:adjLst/>
+        </dgm:shape>
+        <dgm:presOf axis="desOrSelf" ptType="node"/>
+        <dgm:constrLst>
+          <dgm:constr type="lMarg" refType="primFontSz" fact="0.3"/>
+          <dgm:constr type="rMarg" refType="primFontSz" fact="0.3"/>
+          <dgm:constr type="tMarg" refType="primFontSz" fact="0.3"/>
+          <dgm:constr type="bMarg" refType="primFontSz" fact="0.3"/>
+        </dgm:constrLst>
+        <dgm:ruleLst>
+          <dgm:rule type="primFontSz" val="5" fact="NaN" max="NaN"/>
+        </dgm:ruleLst>
+      </dgm:layoutNode>
+      <dgm:forEach name="Name4" axis="followSib" ptType="sibTrans" cnt="1">
+        <dgm:layoutNode name="sibTrans">
+          <dgm:alg type="sp"/>
+          <dgm:shape xmlns:r="http://schemas.openxmlformats.org/officeDocument/2006/relationships" r:blip="">
+            <dgm:adjLst/>
+          </dgm:shape>
+          <dgm:presOf/>
+          <dgm:constrLst/>
+          <dgm:ruleLst/>
+        </dgm:layoutNode>
+      </dgm:forEach>
+    </dgm:forEach>
+  </dgm:layoutNode>
+</dgm:layoutDef>
+</file>
+
+<file path=ppt/diagrams/layout3.xml><?xml version="1.0" encoding="utf-8"?>
 <dgm:layoutDef xmlns:dgm="http://schemas.openxmlformats.org/drawingml/2006/diagram" xmlns:a="http://schemas.openxmlformats.org/drawingml/2006/main" uniqueId="urn:microsoft.com/office/officeart/2018/5/layout/CenteredIconLabelDescriptionList">
   <dgm:title val="Centered Icon Label Description List"/>
   <dgm:desc val="Use to show non-sequential or grouped chunks of information. The placeholder holds an icon or small picture, and corresponding text boxes show Level 1 and Level 2 text respectively. Works well for minimal Level 1 text accompanied by lengthier Level two text."/>
@@ -9138,7 +11107,7 @@
 </dgm:layoutDef>
 </file>
 
-<file path=ppt/diagrams/layout3.xml><?xml version="1.0" encoding="utf-8"?>
+<file path=ppt/diagrams/layout4.xml><?xml version="1.0" encoding="utf-8"?>
 <dgm:layoutDef xmlns:dgm="http://schemas.openxmlformats.org/drawingml/2006/diagram" xmlns:a="http://schemas.openxmlformats.org/drawingml/2006/main" uniqueId="urn:microsoft.com/office/officeart/2005/8/layout/vList2">
   <dgm:title val=""/>
   <dgm:desc val=""/>
@@ -9305,7 +11274,7 @@
 </dgm:layoutDef>
 </file>
 
-<file path=ppt/diagrams/layout4.xml><?xml version="1.0" encoding="utf-8"?>
+<file path=ppt/diagrams/layout5.xml><?xml version="1.0" encoding="utf-8"?>
 <dgm:layoutDef xmlns:dgm="http://schemas.openxmlformats.org/drawingml/2006/diagram" xmlns:a="http://schemas.openxmlformats.org/drawingml/2006/main" uniqueId="urn:microsoft.com/office/officeart/2018/2/layout/IconVerticalSolidList">
   <dgm:title val="Icon Vertical Solid List"/>
   <dgm:desc val="Use to show a series of visuals from top to bottom with Level 1 or Level 1 and Level 2 text grouped in a shape. Works best with icons or small pictures with lengthier descriptions."/>
@@ -13735,6 +15704,1040 @@
 </dgm:styleDef>
 </file>
 
+<file path=ppt/diagrams/quickStyle5.xml><?xml version="1.0" encoding="utf-8"?>
+<dgm:styleDef xmlns:dgm="http://schemas.openxmlformats.org/drawingml/2006/diagram" xmlns:a="http://schemas.openxmlformats.org/drawingml/2006/main" uniqueId="urn:microsoft.com/office/officeart/2005/8/quickstyle/simple1">
+  <dgm:title val=""/>
+  <dgm:desc val=""/>
+  <dgm:catLst>
+    <dgm:cat type="simple" pri="10100"/>
+  </dgm:catLst>
+  <dgm:scene3d>
+    <a:camera prst="orthographicFront"/>
+    <a:lightRig rig="threePt" dir="t"/>
+  </dgm:scene3d>
+  <dgm:styleLbl name="node0">
+    <dgm:scene3d>
+      <a:camera prst="orthographicFront"/>
+      <a:lightRig rig="threePt" dir="t"/>
+    </dgm:scene3d>
+    <dgm:sp3d/>
+    <dgm:txPr/>
+    <dgm:style>
+      <a:lnRef idx="2">
+        <a:scrgbClr r="0" g="0" b="0"/>
+      </a:lnRef>
+      <a:fillRef idx="1">
+        <a:scrgbClr r="0" g="0" b="0"/>
+      </a:fillRef>
+      <a:effectRef idx="0">
+        <a:scrgbClr r="0" g="0" b="0"/>
+      </a:effectRef>
+      <a:fontRef idx="minor">
+        <a:schemeClr val="lt1"/>
+      </a:fontRef>
+    </dgm:style>
+  </dgm:styleLbl>
+  <dgm:styleLbl name="lnNode1">
+    <dgm:scene3d>
+      <a:camera prst="orthographicFront"/>
+      <a:lightRig rig="threePt" dir="t"/>
+    </dgm:scene3d>
+    <dgm:sp3d/>
+    <dgm:txPr/>
+    <dgm:style>
+      <a:lnRef idx="2">
+        <a:scrgbClr r="0" g="0" b="0"/>
+      </a:lnRef>
+      <a:fillRef idx="1">
+        <a:scrgbClr r="0" g="0" b="0"/>
+      </a:fillRef>
+      <a:effectRef idx="0">
+        <a:scrgbClr r="0" g="0" b="0"/>
+      </a:effectRef>
+      <a:fontRef idx="minor">
+        <a:schemeClr val="lt1"/>
+      </a:fontRef>
+    </dgm:style>
+  </dgm:styleLbl>
+  <dgm:styleLbl name="vennNode1">
+    <dgm:scene3d>
+      <a:camera prst="orthographicFront"/>
+      <a:lightRig rig="threePt" dir="t"/>
+    </dgm:scene3d>
+    <dgm:sp3d/>
+    <dgm:txPr/>
+    <dgm:style>
+      <a:lnRef idx="2">
+        <a:scrgbClr r="0" g="0" b="0"/>
+      </a:lnRef>
+      <a:fillRef idx="1">
+        <a:scrgbClr r="0" g="0" b="0"/>
+      </a:fillRef>
+      <a:effectRef idx="0">
+        <a:scrgbClr r="0" g="0" b="0"/>
+      </a:effectRef>
+      <a:fontRef idx="minor">
+        <a:schemeClr val="tx1"/>
+      </a:fontRef>
+    </dgm:style>
+  </dgm:styleLbl>
+  <dgm:styleLbl name="alignNode1">
+    <dgm:scene3d>
+      <a:camera prst="orthographicFront"/>
+      <a:lightRig rig="threePt" dir="t"/>
+    </dgm:scene3d>
+    <dgm:sp3d/>
+    <dgm:txPr/>
+    <dgm:style>
+      <a:lnRef idx="2">
+        <a:scrgbClr r="0" g="0" b="0"/>
+      </a:lnRef>
+      <a:fillRef idx="1">
+        <a:scrgbClr r="0" g="0" b="0"/>
+      </a:fillRef>
+      <a:effectRef idx="0">
+        <a:scrgbClr r="0" g="0" b="0"/>
+      </a:effectRef>
+      <a:fontRef idx="minor">
+        <a:schemeClr val="lt1"/>
+      </a:fontRef>
+    </dgm:style>
+  </dgm:styleLbl>
+  <dgm:styleLbl name="node1">
+    <dgm:scene3d>
+      <a:camera prst="orthographicFront"/>
+      <a:lightRig rig="threePt" dir="t"/>
+    </dgm:scene3d>
+    <dgm:sp3d/>
+    <dgm:txPr/>
+    <dgm:style>
+      <a:lnRef idx="2">
+        <a:scrgbClr r="0" g="0" b="0"/>
+      </a:lnRef>
+      <a:fillRef idx="1">
+        <a:scrgbClr r="0" g="0" b="0"/>
+      </a:fillRef>
+      <a:effectRef idx="0">
+        <a:scrgbClr r="0" g="0" b="0"/>
+      </a:effectRef>
+      <a:fontRef idx="minor">
+        <a:schemeClr val="lt1"/>
+      </a:fontRef>
+    </dgm:style>
+  </dgm:styleLbl>
+  <dgm:styleLbl name="node2">
+    <dgm:scene3d>
+      <a:camera prst="orthographicFront"/>
+      <a:lightRig rig="threePt" dir="t"/>
+    </dgm:scene3d>
+    <dgm:sp3d/>
+    <dgm:txPr/>
+    <dgm:style>
+      <a:lnRef idx="2">
+        <a:scrgbClr r="0" g="0" b="0"/>
+      </a:lnRef>
+      <a:fillRef idx="1">
+        <a:scrgbClr r="0" g="0" b="0"/>
+      </a:fillRef>
+      <a:effectRef idx="0">
+        <a:scrgbClr r="0" g="0" b="0"/>
+      </a:effectRef>
+      <a:fontRef idx="minor">
+        <a:schemeClr val="lt1"/>
+      </a:fontRef>
+    </dgm:style>
+  </dgm:styleLbl>
+  <dgm:styleLbl name="node3">
+    <dgm:scene3d>
+      <a:camera prst="orthographicFront"/>
+      <a:lightRig rig="threePt" dir="t"/>
+    </dgm:scene3d>
+    <dgm:sp3d/>
+    <dgm:txPr/>
+    <dgm:style>
+      <a:lnRef idx="2">
+        <a:scrgbClr r="0" g="0" b="0"/>
+      </a:lnRef>
+      <a:fillRef idx="1">
+        <a:scrgbClr r="0" g="0" b="0"/>
+      </a:fillRef>
+      <a:effectRef idx="0">
+        <a:scrgbClr r="0" g="0" b="0"/>
+      </a:effectRef>
+      <a:fontRef idx="minor">
+        <a:schemeClr val="lt1"/>
+      </a:fontRef>
+    </dgm:style>
+  </dgm:styleLbl>
+  <dgm:styleLbl name="node4">
+    <dgm:scene3d>
+      <a:camera prst="orthographicFront"/>
+      <a:lightRig rig="threePt" dir="t"/>
+    </dgm:scene3d>
+    <dgm:sp3d/>
+    <dgm:txPr/>
+    <dgm:style>
+      <a:lnRef idx="2">
+        <a:scrgbClr r="0" g="0" b="0"/>
+      </a:lnRef>
+      <a:fillRef idx="1">
+        <a:scrgbClr r="0" g="0" b="0"/>
+      </a:fillRef>
+      <a:effectRef idx="0">
+        <a:scrgbClr r="0" g="0" b="0"/>
+      </a:effectRef>
+      <a:fontRef idx="minor">
+        <a:schemeClr val="lt1"/>
+      </a:fontRef>
+    </dgm:style>
+  </dgm:styleLbl>
+  <dgm:styleLbl name="fgImgPlace1">
+    <dgm:scene3d>
+      <a:camera prst="orthographicFront"/>
+      <a:lightRig rig="threePt" dir="t"/>
+    </dgm:scene3d>
+    <dgm:sp3d/>
+    <dgm:txPr/>
+    <dgm:style>
+      <a:lnRef idx="2">
+        <a:scrgbClr r="0" g="0" b="0"/>
+      </a:lnRef>
+      <a:fillRef idx="1">
+        <a:scrgbClr r="0" g="0" b="0"/>
+      </a:fillRef>
+      <a:effectRef idx="0">
+        <a:scrgbClr r="0" g="0" b="0"/>
+      </a:effectRef>
+      <a:fontRef idx="minor"/>
+    </dgm:style>
+  </dgm:styleLbl>
+  <dgm:styleLbl name="alignImgPlace1">
+    <dgm:scene3d>
+      <a:camera prst="orthographicFront"/>
+      <a:lightRig rig="threePt" dir="t"/>
+    </dgm:scene3d>
+    <dgm:sp3d/>
+    <dgm:txPr/>
+    <dgm:style>
+      <a:lnRef idx="2">
+        <a:scrgbClr r="0" g="0" b="0"/>
+      </a:lnRef>
+      <a:fillRef idx="1">
+        <a:scrgbClr r="0" g="0" b="0"/>
+      </a:fillRef>
+      <a:effectRef idx="0">
+        <a:scrgbClr r="0" g="0" b="0"/>
+      </a:effectRef>
+      <a:fontRef idx="minor"/>
+    </dgm:style>
+  </dgm:styleLbl>
+  <dgm:styleLbl name="bgImgPlace1">
+    <dgm:scene3d>
+      <a:camera prst="orthographicFront"/>
+      <a:lightRig rig="threePt" dir="t"/>
+    </dgm:scene3d>
+    <dgm:sp3d/>
+    <dgm:txPr/>
+    <dgm:style>
+      <a:lnRef idx="2">
+        <a:scrgbClr r="0" g="0" b="0"/>
+      </a:lnRef>
+      <a:fillRef idx="1">
+        <a:scrgbClr r="0" g="0" b="0"/>
+      </a:fillRef>
+      <a:effectRef idx="0">
+        <a:scrgbClr r="0" g="0" b="0"/>
+      </a:effectRef>
+      <a:fontRef idx="minor"/>
+    </dgm:style>
+  </dgm:styleLbl>
+  <dgm:styleLbl name="sibTrans2D1">
+    <dgm:scene3d>
+      <a:camera prst="orthographicFront"/>
+      <a:lightRig rig="threePt" dir="t"/>
+    </dgm:scene3d>
+    <dgm:sp3d/>
+    <dgm:txPr/>
+    <dgm:style>
+      <a:lnRef idx="0">
+        <a:scrgbClr r="0" g="0" b="0"/>
+      </a:lnRef>
+      <a:fillRef idx="1">
+        <a:scrgbClr r="0" g="0" b="0"/>
+      </a:fillRef>
+      <a:effectRef idx="0">
+        <a:scrgbClr r="0" g="0" b="0"/>
+      </a:effectRef>
+      <a:fontRef idx="minor">
+        <a:schemeClr val="lt1"/>
+      </a:fontRef>
+    </dgm:style>
+  </dgm:styleLbl>
+  <dgm:styleLbl name="fgSibTrans2D1">
+    <dgm:scene3d>
+      <a:camera prst="orthographicFront"/>
+      <a:lightRig rig="threePt" dir="t"/>
+    </dgm:scene3d>
+    <dgm:sp3d/>
+    <dgm:txPr/>
+    <dgm:style>
+      <a:lnRef idx="0">
+        <a:scrgbClr r="0" g="0" b="0"/>
+      </a:lnRef>
+      <a:fillRef idx="1">
+        <a:scrgbClr r="0" g="0" b="0"/>
+      </a:fillRef>
+      <a:effectRef idx="0">
+        <a:scrgbClr r="0" g="0" b="0"/>
+      </a:effectRef>
+      <a:fontRef idx="minor">
+        <a:schemeClr val="lt1"/>
+      </a:fontRef>
+    </dgm:style>
+  </dgm:styleLbl>
+  <dgm:styleLbl name="bgSibTrans2D1">
+    <dgm:scene3d>
+      <a:camera prst="orthographicFront"/>
+      <a:lightRig rig="threePt" dir="t"/>
+    </dgm:scene3d>
+    <dgm:sp3d/>
+    <dgm:txPr/>
+    <dgm:style>
+      <a:lnRef idx="0">
+        <a:scrgbClr r="0" g="0" b="0"/>
+      </a:lnRef>
+      <a:fillRef idx="1">
+        <a:scrgbClr r="0" g="0" b="0"/>
+      </a:fillRef>
+      <a:effectRef idx="0">
+        <a:scrgbClr r="0" g="0" b="0"/>
+      </a:effectRef>
+      <a:fontRef idx="minor">
+        <a:schemeClr val="lt1"/>
+      </a:fontRef>
+    </dgm:style>
+  </dgm:styleLbl>
+  <dgm:styleLbl name="sibTrans1D1">
+    <dgm:scene3d>
+      <a:camera prst="orthographicFront"/>
+      <a:lightRig rig="threePt" dir="t"/>
+    </dgm:scene3d>
+    <dgm:sp3d/>
+    <dgm:txPr/>
+    <dgm:style>
+      <a:lnRef idx="1">
+        <a:scrgbClr r="0" g="0" b="0"/>
+      </a:lnRef>
+      <a:fillRef idx="0">
+        <a:scrgbClr r="0" g="0" b="0"/>
+      </a:fillRef>
+      <a:effectRef idx="0">
+        <a:scrgbClr r="0" g="0" b="0"/>
+      </a:effectRef>
+      <a:fontRef idx="minor"/>
+    </dgm:style>
+  </dgm:styleLbl>
+  <dgm:styleLbl name="callout">
+    <dgm:scene3d>
+      <a:camera prst="orthographicFront"/>
+      <a:lightRig rig="threePt" dir="t"/>
+    </dgm:scene3d>
+    <dgm:sp3d/>
+    <dgm:txPr/>
+    <dgm:style>
+      <a:lnRef idx="2">
+        <a:scrgbClr r="0" g="0" b="0"/>
+      </a:lnRef>
+      <a:fillRef idx="1">
+        <a:scrgbClr r="0" g="0" b="0"/>
+      </a:fillRef>
+      <a:effectRef idx="0">
+        <a:scrgbClr r="0" g="0" b="0"/>
+      </a:effectRef>
+      <a:fontRef idx="minor"/>
+    </dgm:style>
+  </dgm:styleLbl>
+  <dgm:styleLbl name="asst0">
+    <dgm:scene3d>
+      <a:camera prst="orthographicFront"/>
+      <a:lightRig rig="threePt" dir="t"/>
+    </dgm:scene3d>
+    <dgm:sp3d/>
+    <dgm:txPr/>
+    <dgm:style>
+      <a:lnRef idx="2">
+        <a:scrgbClr r="0" g="0" b="0"/>
+      </a:lnRef>
+      <a:fillRef idx="1">
+        <a:scrgbClr r="0" g="0" b="0"/>
+      </a:fillRef>
+      <a:effectRef idx="0">
+        <a:scrgbClr r="0" g="0" b="0"/>
+      </a:effectRef>
+      <a:fontRef idx="minor">
+        <a:schemeClr val="lt1"/>
+      </a:fontRef>
+    </dgm:style>
+  </dgm:styleLbl>
+  <dgm:styleLbl name="asst1">
+    <dgm:scene3d>
+      <a:camera prst="orthographicFront"/>
+      <a:lightRig rig="threePt" dir="t"/>
+    </dgm:scene3d>
+    <dgm:sp3d/>
+    <dgm:txPr/>
+    <dgm:style>
+      <a:lnRef idx="2">
+        <a:scrgbClr r="0" g="0" b="0"/>
+      </a:lnRef>
+      <a:fillRef idx="1">
+        <a:scrgbClr r="0" g="0" b="0"/>
+      </a:fillRef>
+      <a:effectRef idx="0">
+        <a:scrgbClr r="0" g="0" b="0"/>
+      </a:effectRef>
+      <a:fontRef idx="minor">
+        <a:schemeClr val="lt1"/>
+      </a:fontRef>
+    </dgm:style>
+  </dgm:styleLbl>
+  <dgm:styleLbl name="asst2">
+    <dgm:scene3d>
+      <a:camera prst="orthographicFront"/>
+      <a:lightRig rig="threePt" dir="t"/>
+    </dgm:scene3d>
+    <dgm:sp3d/>
+    <dgm:txPr/>
+    <dgm:style>
+      <a:lnRef idx="2">
+        <a:scrgbClr r="0" g="0" b="0"/>
+      </a:lnRef>
+      <a:fillRef idx="1">
+        <a:scrgbClr r="0" g="0" b="0"/>
+      </a:fillRef>
+      <a:effectRef idx="0">
+        <a:scrgbClr r="0" g="0" b="0"/>
+      </a:effectRef>
+      <a:fontRef idx="minor">
+        <a:schemeClr val="lt1"/>
+      </a:fontRef>
+    </dgm:style>
+  </dgm:styleLbl>
+  <dgm:styleLbl name="asst3">
+    <dgm:scene3d>
+      <a:camera prst="orthographicFront"/>
+      <a:lightRig rig="threePt" dir="t"/>
+    </dgm:scene3d>
+    <dgm:sp3d/>
+    <dgm:txPr/>
+    <dgm:style>
+      <a:lnRef idx="2">
+        <a:scrgbClr r="0" g="0" b="0"/>
+      </a:lnRef>
+      <a:fillRef idx="1">
+        <a:scrgbClr r="0" g="0" b="0"/>
+      </a:fillRef>
+      <a:effectRef idx="0">
+        <a:scrgbClr r="0" g="0" b="0"/>
+      </a:effectRef>
+      <a:fontRef idx="minor">
+        <a:schemeClr val="lt1"/>
+      </a:fontRef>
+    </dgm:style>
+  </dgm:styleLbl>
+  <dgm:styleLbl name="asst4">
+    <dgm:scene3d>
+      <a:camera prst="orthographicFront"/>
+      <a:lightRig rig="threePt" dir="t"/>
+    </dgm:scene3d>
+    <dgm:sp3d/>
+    <dgm:txPr/>
+    <dgm:style>
+      <a:lnRef idx="2">
+        <a:scrgbClr r="0" g="0" b="0"/>
+      </a:lnRef>
+      <a:fillRef idx="1">
+        <a:scrgbClr r="0" g="0" b="0"/>
+      </a:fillRef>
+      <a:effectRef idx="0">
+        <a:scrgbClr r="0" g="0" b="0"/>
+      </a:effectRef>
+      <a:fontRef idx="minor">
+        <a:schemeClr val="lt1"/>
+      </a:fontRef>
+    </dgm:style>
+  </dgm:styleLbl>
+  <dgm:styleLbl name="parChTrans2D1">
+    <dgm:scene3d>
+      <a:camera prst="orthographicFront"/>
+      <a:lightRig rig="threePt" dir="t"/>
+    </dgm:scene3d>
+    <dgm:sp3d/>
+    <dgm:txPr/>
+    <dgm:style>
+      <a:lnRef idx="2">
+        <a:scrgbClr r="0" g="0" b="0"/>
+      </a:lnRef>
+      <a:fillRef idx="1">
+        <a:scrgbClr r="0" g="0" b="0"/>
+      </a:fillRef>
+      <a:effectRef idx="0">
+        <a:scrgbClr r="0" g="0" b="0"/>
+      </a:effectRef>
+      <a:fontRef idx="minor">
+        <a:schemeClr val="lt1"/>
+      </a:fontRef>
+    </dgm:style>
+  </dgm:styleLbl>
+  <dgm:styleLbl name="parChTrans2D2">
+    <dgm:scene3d>
+      <a:camera prst="orthographicFront"/>
+      <a:lightRig rig="threePt" dir="t"/>
+    </dgm:scene3d>
+    <dgm:sp3d/>
+    <dgm:txPr/>
+    <dgm:style>
+      <a:lnRef idx="2">
+        <a:scrgbClr r="0" g="0" b="0"/>
+      </a:lnRef>
+      <a:fillRef idx="1">
+        <a:scrgbClr r="0" g="0" b="0"/>
+      </a:fillRef>
+      <a:effectRef idx="0">
+        <a:scrgbClr r="0" g="0" b="0"/>
+      </a:effectRef>
+      <a:fontRef idx="minor">
+        <a:schemeClr val="lt1"/>
+      </a:fontRef>
+    </dgm:style>
+  </dgm:styleLbl>
+  <dgm:styleLbl name="parChTrans2D3">
+    <dgm:scene3d>
+      <a:camera prst="orthographicFront"/>
+      <a:lightRig rig="threePt" dir="t"/>
+    </dgm:scene3d>
+    <dgm:sp3d/>
+    <dgm:txPr/>
+    <dgm:style>
+      <a:lnRef idx="2">
+        <a:scrgbClr r="0" g="0" b="0"/>
+      </a:lnRef>
+      <a:fillRef idx="1">
+        <a:scrgbClr r="0" g="0" b="0"/>
+      </a:fillRef>
+      <a:effectRef idx="0">
+        <a:scrgbClr r="0" g="0" b="0"/>
+      </a:effectRef>
+      <a:fontRef idx="minor">
+        <a:schemeClr val="lt1"/>
+      </a:fontRef>
+    </dgm:style>
+  </dgm:styleLbl>
+  <dgm:styleLbl name="parChTrans2D4">
+    <dgm:scene3d>
+      <a:camera prst="orthographicFront"/>
+      <a:lightRig rig="threePt" dir="t"/>
+    </dgm:scene3d>
+    <dgm:sp3d/>
+    <dgm:txPr/>
+    <dgm:style>
+      <a:lnRef idx="2">
+        <a:scrgbClr r="0" g="0" b="0"/>
+      </a:lnRef>
+      <a:fillRef idx="1">
+        <a:scrgbClr r="0" g="0" b="0"/>
+      </a:fillRef>
+      <a:effectRef idx="0">
+        <a:scrgbClr r="0" g="0" b="0"/>
+      </a:effectRef>
+      <a:fontRef idx="minor">
+        <a:schemeClr val="lt1"/>
+      </a:fontRef>
+    </dgm:style>
+  </dgm:styleLbl>
+  <dgm:styleLbl name="parChTrans1D1">
+    <dgm:scene3d>
+      <a:camera prst="orthographicFront"/>
+      <a:lightRig rig="threePt" dir="t"/>
+    </dgm:scene3d>
+    <dgm:sp3d/>
+    <dgm:txPr/>
+    <dgm:style>
+      <a:lnRef idx="2">
+        <a:scrgbClr r="0" g="0" b="0"/>
+      </a:lnRef>
+      <a:fillRef idx="0">
+        <a:scrgbClr r="0" g="0" b="0"/>
+      </a:fillRef>
+      <a:effectRef idx="0">
+        <a:scrgbClr r="0" g="0" b="0"/>
+      </a:effectRef>
+      <a:fontRef idx="minor"/>
+    </dgm:style>
+  </dgm:styleLbl>
+  <dgm:styleLbl name="parChTrans1D2">
+    <dgm:scene3d>
+      <a:camera prst="orthographicFront"/>
+      <a:lightRig rig="threePt" dir="t"/>
+    </dgm:scene3d>
+    <dgm:sp3d/>
+    <dgm:txPr/>
+    <dgm:style>
+      <a:lnRef idx="2">
+        <a:scrgbClr r="0" g="0" b="0"/>
+      </a:lnRef>
+      <a:fillRef idx="0">
+        <a:scrgbClr r="0" g="0" b="0"/>
+      </a:fillRef>
+      <a:effectRef idx="0">
+        <a:scrgbClr r="0" g="0" b="0"/>
+      </a:effectRef>
+      <a:fontRef idx="minor"/>
+    </dgm:style>
+  </dgm:styleLbl>
+  <dgm:styleLbl name="parChTrans1D3">
+    <dgm:scene3d>
+      <a:camera prst="orthographicFront"/>
+      <a:lightRig rig="threePt" dir="t"/>
+    </dgm:scene3d>
+    <dgm:sp3d/>
+    <dgm:txPr/>
+    <dgm:style>
+      <a:lnRef idx="2">
+        <a:scrgbClr r="0" g="0" b="0"/>
+      </a:lnRef>
+      <a:fillRef idx="0">
+        <a:scrgbClr r="0" g="0" b="0"/>
+      </a:fillRef>
+      <a:effectRef idx="0">
+        <a:scrgbClr r="0" g="0" b="0"/>
+      </a:effectRef>
+      <a:fontRef idx="minor"/>
+    </dgm:style>
+  </dgm:styleLbl>
+  <dgm:styleLbl name="parChTrans1D4">
+    <dgm:scene3d>
+      <a:camera prst="orthographicFront"/>
+      <a:lightRig rig="threePt" dir="t"/>
+    </dgm:scene3d>
+    <dgm:sp3d/>
+    <dgm:txPr/>
+    <dgm:style>
+      <a:lnRef idx="2">
+        <a:scrgbClr r="0" g="0" b="0"/>
+      </a:lnRef>
+      <a:fillRef idx="0">
+        <a:scrgbClr r="0" g="0" b="0"/>
+      </a:fillRef>
+      <a:effectRef idx="0">
+        <a:scrgbClr r="0" g="0" b="0"/>
+      </a:effectRef>
+      <a:fontRef idx="minor"/>
+    </dgm:style>
+  </dgm:styleLbl>
+  <dgm:styleLbl name="fgAcc1">
+    <dgm:scene3d>
+      <a:camera prst="orthographicFront"/>
+      <a:lightRig rig="threePt" dir="t"/>
+    </dgm:scene3d>
+    <dgm:sp3d/>
+    <dgm:txPr/>
+    <dgm:style>
+      <a:lnRef idx="2">
+        <a:scrgbClr r="0" g="0" b="0"/>
+      </a:lnRef>
+      <a:fillRef idx="1">
+        <a:scrgbClr r="0" g="0" b="0"/>
+      </a:fillRef>
+      <a:effectRef idx="0">
+        <a:scrgbClr r="0" g="0" b="0"/>
+      </a:effectRef>
+      <a:fontRef idx="minor"/>
+    </dgm:style>
+  </dgm:styleLbl>
+  <dgm:styleLbl name="conFgAcc1">
+    <dgm:scene3d>
+      <a:camera prst="orthographicFront"/>
+      <a:lightRig rig="threePt" dir="t"/>
+    </dgm:scene3d>
+    <dgm:sp3d/>
+    <dgm:txPr/>
+    <dgm:style>
+      <a:lnRef idx="2">
+        <a:scrgbClr r="0" g="0" b="0"/>
+      </a:lnRef>
+      <a:fillRef idx="1">
+        <a:scrgbClr r="0" g="0" b="0"/>
+      </a:fillRef>
+      <a:effectRef idx="0">
+        <a:scrgbClr r="0" g="0" b="0"/>
+      </a:effectRef>
+      <a:fontRef idx="minor"/>
+    </dgm:style>
+  </dgm:styleLbl>
+  <dgm:styleLbl name="alignAcc1">
+    <dgm:scene3d>
+      <a:camera prst="orthographicFront"/>
+      <a:lightRig rig="threePt" dir="t"/>
+    </dgm:scene3d>
+    <dgm:sp3d/>
+    <dgm:txPr/>
+    <dgm:style>
+      <a:lnRef idx="2">
+        <a:scrgbClr r="0" g="0" b="0"/>
+      </a:lnRef>
+      <a:fillRef idx="1">
+        <a:scrgbClr r="0" g="0" b="0"/>
+      </a:fillRef>
+      <a:effectRef idx="0">
+        <a:scrgbClr r="0" g="0" b="0"/>
+      </a:effectRef>
+      <a:fontRef idx="minor"/>
+    </dgm:style>
+  </dgm:styleLbl>
+  <dgm:styleLbl name="trAlignAcc1">
+    <dgm:scene3d>
+      <a:camera prst="orthographicFront"/>
+      <a:lightRig rig="threePt" dir="t"/>
+    </dgm:scene3d>
+    <dgm:sp3d/>
+    <dgm:txPr/>
+    <dgm:style>
+      <a:lnRef idx="1">
+        <a:scrgbClr r="0" g="0" b="0"/>
+      </a:lnRef>
+      <a:fillRef idx="1">
+        <a:scrgbClr r="0" g="0" b="0"/>
+      </a:fillRef>
+      <a:effectRef idx="0">
+        <a:scrgbClr r="0" g="0" b="0"/>
+      </a:effectRef>
+      <a:fontRef idx="minor"/>
+    </dgm:style>
+  </dgm:styleLbl>
+  <dgm:styleLbl name="bgAcc1">
+    <dgm:scene3d>
+      <a:camera prst="orthographicFront"/>
+      <a:lightRig rig="threePt" dir="t"/>
+    </dgm:scene3d>
+    <dgm:sp3d/>
+    <dgm:txPr/>
+    <dgm:style>
+      <a:lnRef idx="2">
+        <a:scrgbClr r="0" g="0" b="0"/>
+      </a:lnRef>
+      <a:fillRef idx="1">
+        <a:scrgbClr r="0" g="0" b="0"/>
+      </a:fillRef>
+      <a:effectRef idx="0">
+        <a:scrgbClr r="0" g="0" b="0"/>
+      </a:effectRef>
+      <a:fontRef idx="minor"/>
+    </dgm:style>
+  </dgm:styleLbl>
+  <dgm:styleLbl name="solidFgAcc1">
+    <dgm:scene3d>
+      <a:camera prst="orthographicFront"/>
+      <a:lightRig rig="threePt" dir="t"/>
+    </dgm:scene3d>
+    <dgm:sp3d/>
+    <dgm:txPr/>
+    <dgm:style>
+      <a:lnRef idx="2">
+        <a:scrgbClr r="0" g="0" b="0"/>
+      </a:lnRef>
+      <a:fillRef idx="1">
+        <a:scrgbClr r="0" g="0" b="0"/>
+      </a:fillRef>
+      <a:effectRef idx="0">
+        <a:scrgbClr r="0" g="0" b="0"/>
+      </a:effectRef>
+      <a:fontRef idx="minor"/>
+    </dgm:style>
+  </dgm:styleLbl>
+  <dgm:styleLbl name="solidAlignAcc1">
+    <dgm:scene3d>
+      <a:camera prst="orthographicFront"/>
+      <a:lightRig rig="threePt" dir="t"/>
+    </dgm:scene3d>
+    <dgm:sp3d/>
+    <dgm:txPr/>
+    <dgm:style>
+      <a:lnRef idx="2">
+        <a:scrgbClr r="0" g="0" b="0"/>
+      </a:lnRef>
+      <a:fillRef idx="1">
+        <a:scrgbClr r="0" g="0" b="0"/>
+      </a:fillRef>
+      <a:effectRef idx="0">
+        <a:scrgbClr r="0" g="0" b="0"/>
+      </a:effectRef>
+      <a:fontRef idx="minor"/>
+    </dgm:style>
+  </dgm:styleLbl>
+  <dgm:styleLbl name="solidBgAcc1">
+    <dgm:scene3d>
+      <a:camera prst="orthographicFront"/>
+      <a:lightRig rig="threePt" dir="t"/>
+    </dgm:scene3d>
+    <dgm:sp3d/>
+    <dgm:txPr/>
+    <dgm:style>
+      <a:lnRef idx="2">
+        <a:scrgbClr r="0" g="0" b="0"/>
+      </a:lnRef>
+      <a:fillRef idx="1">
+        <a:scrgbClr r="0" g="0" b="0"/>
+      </a:fillRef>
+      <a:effectRef idx="0">
+        <a:scrgbClr r="0" g="0" b="0"/>
+      </a:effectRef>
+      <a:fontRef idx="minor"/>
+    </dgm:style>
+  </dgm:styleLbl>
+  <dgm:styleLbl name="fgAccFollowNode1">
+    <dgm:scene3d>
+      <a:camera prst="orthographicFront"/>
+      <a:lightRig rig="threePt" dir="t"/>
+    </dgm:scene3d>
+    <dgm:sp3d/>
+    <dgm:txPr/>
+    <dgm:style>
+      <a:lnRef idx="2">
+        <a:scrgbClr r="0" g="0" b="0"/>
+      </a:lnRef>
+      <a:fillRef idx="1">
+        <a:scrgbClr r="0" g="0" b="0"/>
+      </a:fillRef>
+      <a:effectRef idx="0">
+        <a:scrgbClr r="0" g="0" b="0"/>
+      </a:effectRef>
+      <a:fontRef idx="minor"/>
+    </dgm:style>
+  </dgm:styleLbl>
+  <dgm:styleLbl name="alignAccFollowNode1">
+    <dgm:scene3d>
+      <a:camera prst="orthographicFront"/>
+      <a:lightRig rig="threePt" dir="t"/>
+    </dgm:scene3d>
+    <dgm:sp3d/>
+    <dgm:txPr/>
+    <dgm:style>
+      <a:lnRef idx="2">
+        <a:scrgbClr r="0" g="0" b="0"/>
+      </a:lnRef>
+      <a:fillRef idx="1">
+        <a:scrgbClr r="0" g="0" b="0"/>
+      </a:fillRef>
+      <a:effectRef idx="0">
+        <a:scrgbClr r="0" g="0" b="0"/>
+      </a:effectRef>
+      <a:fontRef idx="minor"/>
+    </dgm:style>
+  </dgm:styleLbl>
+  <dgm:styleLbl name="bgAccFollowNode1">
+    <dgm:scene3d>
+      <a:camera prst="orthographicFront"/>
+      <a:lightRig rig="threePt" dir="t"/>
+    </dgm:scene3d>
+    <dgm:sp3d/>
+    <dgm:txPr/>
+    <dgm:style>
+      <a:lnRef idx="2">
+        <a:scrgbClr r="0" g="0" b="0"/>
+      </a:lnRef>
+      <a:fillRef idx="1">
+        <a:scrgbClr r="0" g="0" b="0"/>
+      </a:fillRef>
+      <a:effectRef idx="0">
+        <a:scrgbClr r="0" g="0" b="0"/>
+      </a:effectRef>
+      <a:fontRef idx="minor"/>
+    </dgm:style>
+  </dgm:styleLbl>
+  <dgm:styleLbl name="fgAcc0">
+    <dgm:scene3d>
+      <a:camera prst="orthographicFront"/>
+      <a:lightRig rig="threePt" dir="t"/>
+    </dgm:scene3d>
+    <dgm:sp3d/>
+    <dgm:txPr/>
+    <dgm:style>
+      <a:lnRef idx="2">
+        <a:scrgbClr r="0" g="0" b="0"/>
+      </a:lnRef>
+      <a:fillRef idx="1">
+        <a:scrgbClr r="0" g="0" b="0"/>
+      </a:fillRef>
+      <a:effectRef idx="0">
+        <a:scrgbClr r="0" g="0" b="0"/>
+      </a:effectRef>
+      <a:fontRef idx="minor"/>
+    </dgm:style>
+  </dgm:styleLbl>
+  <dgm:styleLbl name="fgAcc2">
+    <dgm:scene3d>
+      <a:camera prst="orthographicFront"/>
+      <a:lightRig rig="threePt" dir="t"/>
+    </dgm:scene3d>
+    <dgm:sp3d/>
+    <dgm:txPr/>
+    <dgm:style>
+      <a:lnRef idx="2">
+        <a:scrgbClr r="0" g="0" b="0"/>
+      </a:lnRef>
+      <a:fillRef idx="1">
+        <a:scrgbClr r="0" g="0" b="0"/>
+      </a:fillRef>
+      <a:effectRef idx="0">
+        <a:scrgbClr r="0" g="0" b="0"/>
+      </a:effectRef>
+      <a:fontRef idx="minor"/>
+    </dgm:style>
+  </dgm:styleLbl>
+  <dgm:styleLbl name="fgAcc3">
+    <dgm:scene3d>
+      <a:camera prst="orthographicFront"/>
+      <a:lightRig rig="threePt" dir="t"/>
+    </dgm:scene3d>
+    <dgm:sp3d/>
+    <dgm:txPr/>
+    <dgm:style>
+      <a:lnRef idx="2">
+        <a:scrgbClr r="0" g="0" b="0"/>
+      </a:lnRef>
+      <a:fillRef idx="1">
+        <a:scrgbClr r="0" g="0" b="0"/>
+      </a:fillRef>
+      <a:effectRef idx="0">
+        <a:scrgbClr r="0" g="0" b="0"/>
+      </a:effectRef>
+      <a:fontRef idx="minor"/>
+    </dgm:style>
+  </dgm:styleLbl>
+  <dgm:styleLbl name="fgAcc4">
+    <dgm:scene3d>
+      <a:camera prst="orthographicFront"/>
+      <a:lightRig rig="threePt" dir="t"/>
+    </dgm:scene3d>
+    <dgm:sp3d/>
+    <dgm:txPr/>
+    <dgm:style>
+      <a:lnRef idx="2">
+        <a:scrgbClr r="0" g="0" b="0"/>
+      </a:lnRef>
+      <a:fillRef idx="1">
+        <a:scrgbClr r="0" g="0" b="0"/>
+      </a:fillRef>
+      <a:effectRef idx="0">
+        <a:scrgbClr r="0" g="0" b="0"/>
+      </a:effectRef>
+      <a:fontRef idx="minor"/>
+    </dgm:style>
+  </dgm:styleLbl>
+  <dgm:styleLbl name="bgShp">
+    <dgm:scene3d>
+      <a:camera prst="orthographicFront"/>
+      <a:lightRig rig="threePt" dir="t"/>
+    </dgm:scene3d>
+    <dgm:sp3d/>
+    <dgm:txPr/>
+    <dgm:style>
+      <a:lnRef idx="0">
+        <a:scrgbClr r="0" g="0" b="0"/>
+      </a:lnRef>
+      <a:fillRef idx="1">
+        <a:scrgbClr r="0" g="0" b="0"/>
+      </a:fillRef>
+      <a:effectRef idx="0">
+        <a:scrgbClr r="0" g="0" b="0"/>
+      </a:effectRef>
+      <a:fontRef idx="minor"/>
+    </dgm:style>
+  </dgm:styleLbl>
+  <dgm:styleLbl name="dkBgShp">
+    <dgm:scene3d>
+      <a:camera prst="orthographicFront"/>
+      <a:lightRig rig="threePt" dir="t"/>
+    </dgm:scene3d>
+    <dgm:sp3d/>
+    <dgm:txPr/>
+    <dgm:style>
+      <a:lnRef idx="0">
+        <a:scrgbClr r="0" g="0" b="0"/>
+      </a:lnRef>
+      <a:fillRef idx="1">
+        <a:scrgbClr r="0" g="0" b="0"/>
+      </a:fillRef>
+      <a:effectRef idx="0">
+        <a:scrgbClr r="0" g="0" b="0"/>
+      </a:effectRef>
+      <a:fontRef idx="minor"/>
+    </dgm:style>
+  </dgm:styleLbl>
+  <dgm:styleLbl name="trBgShp">
+    <dgm:scene3d>
+      <a:camera prst="orthographicFront"/>
+      <a:lightRig rig="threePt" dir="t"/>
+    </dgm:scene3d>
+    <dgm:sp3d/>
+    <dgm:txPr/>
+    <dgm:style>
+      <a:lnRef idx="0">
+        <a:scrgbClr r="0" g="0" b="0"/>
+      </a:lnRef>
+      <a:fillRef idx="1">
+        <a:scrgbClr r="0" g="0" b="0"/>
+      </a:fillRef>
+      <a:effectRef idx="0">
+        <a:scrgbClr r="0" g="0" b="0"/>
+      </a:effectRef>
+      <a:fontRef idx="minor"/>
+    </dgm:style>
+  </dgm:styleLbl>
+  <dgm:styleLbl name="fgShp">
+    <dgm:scene3d>
+      <a:camera prst="orthographicFront"/>
+      <a:lightRig rig="threePt" dir="t"/>
+    </dgm:scene3d>
+    <dgm:sp3d/>
+    <dgm:txPr/>
+    <dgm:style>
+      <a:lnRef idx="2">
+        <a:scrgbClr r="0" g="0" b="0"/>
+      </a:lnRef>
+      <a:fillRef idx="1">
+        <a:scrgbClr r="0" g="0" b="0"/>
+      </a:fillRef>
+      <a:effectRef idx="0">
+        <a:scrgbClr r="0" g="0" b="0"/>
+      </a:effectRef>
+      <a:fontRef idx="minor"/>
+    </dgm:style>
+  </dgm:styleLbl>
+  <dgm:styleLbl name="revTx">
+    <dgm:scene3d>
+      <a:camera prst="orthographicFront"/>
+      <a:lightRig rig="threePt" dir="t"/>
+    </dgm:scene3d>
+    <dgm:sp3d/>
+    <dgm:txPr/>
+    <dgm:style>
+      <a:lnRef idx="0">
+        <a:scrgbClr r="0" g="0" b="0"/>
+      </a:lnRef>
+      <a:fillRef idx="0">
+        <a:scrgbClr r="0" g="0" b="0"/>
+      </a:fillRef>
+      <a:effectRef idx="0">
+        <a:scrgbClr r="0" g="0" b="0"/>
+      </a:effectRef>
+      <a:fontRef idx="minor"/>
+    </dgm:style>
+  </dgm:styleLbl>
+</dgm:styleDef>
+</file>
+
 <file path=ppt/slideLayouts/slideLayout1.xml><?xml version="1.0" encoding="utf-8"?>
 <p:sldLayout xmlns:a="http://schemas.openxmlformats.org/drawingml/2006/main" xmlns:r="http://schemas.openxmlformats.org/officeDocument/2006/relationships" xmlns:p="http://schemas.openxmlformats.org/presentationml/2006/main" showMasterSp="0" type="title" preserve="1">
   <p:cSld name="Title Slide">
@@ -13904,7 +16907,7 @@
           <a:p>
             <a:fld id="{5DFC374B-5D3B-4E34-8375-9DADCE452C16}" type="datetimeFigureOut">
               <a:rPr lang="en-US" smtClean="0"/>
-              <a:t>10/29/24</a:t>
+              <a:t>11/7/2024</a:t>
             </a:fld>
             <a:endParaRPr lang="en-US"/>
           </a:p>
@@ -14234,7 +17237,7 @@
           <a:p>
             <a:fld id="{5DFC374B-5D3B-4E34-8375-9DADCE452C16}" type="datetimeFigureOut">
               <a:rPr lang="en-US" smtClean="0"/>
-              <a:t>10/29/24</a:t>
+              <a:t>11/7/2024</a:t>
             </a:fld>
             <a:endParaRPr lang="en-US"/>
           </a:p>
@@ -14414,7 +17417,7 @@
           <a:p>
             <a:fld id="{5DFC374B-5D3B-4E34-8375-9DADCE452C16}" type="datetimeFigureOut">
               <a:rPr lang="en-US" smtClean="0"/>
-              <a:t>10/29/24</a:t>
+              <a:t>11/7/2024</a:t>
             </a:fld>
             <a:endParaRPr lang="en-US"/>
           </a:p>
@@ -14584,7 +17587,7 @@
           <a:p>
             <a:fld id="{5DFC374B-5D3B-4E34-8375-9DADCE452C16}" type="datetimeFigureOut">
               <a:rPr lang="en-US" smtClean="0"/>
-              <a:t>10/29/24</a:t>
+              <a:t>11/7/2024</a:t>
             </a:fld>
             <a:endParaRPr lang="en-US"/>
           </a:p>
@@ -14861,7 +17864,7 @@
           <a:p>
             <a:fld id="{5DFC374B-5D3B-4E34-8375-9DADCE452C16}" type="datetimeFigureOut">
               <a:rPr lang="en-US" smtClean="0"/>
-              <a:t>10/29/24</a:t>
+              <a:t>11/7/2024</a:t>
             </a:fld>
             <a:endParaRPr lang="en-US"/>
           </a:p>
@@ -15255,7 +18258,7 @@
           <a:p>
             <a:fld id="{5DFC374B-5D3B-4E34-8375-9DADCE452C16}" type="datetimeFigureOut">
               <a:rPr lang="en-US" smtClean="0"/>
-              <a:t>10/29/24</a:t>
+              <a:t>11/7/2024</a:t>
             </a:fld>
             <a:endParaRPr lang="en-US"/>
           </a:p>
@@ -15732,7 +18735,7 @@
           <a:p>
             <a:fld id="{5DFC374B-5D3B-4E34-8375-9DADCE452C16}" type="datetimeFigureOut">
               <a:rPr lang="en-US" smtClean="0"/>
-              <a:t>10/29/24</a:t>
+              <a:t>11/7/2024</a:t>
             </a:fld>
             <a:endParaRPr lang="en-US"/>
           </a:p>
@@ -15850,7 +18853,7 @@
           <a:p>
             <a:fld id="{5DFC374B-5D3B-4E34-8375-9DADCE452C16}" type="datetimeFigureOut">
               <a:rPr lang="en-US" smtClean="0"/>
-              <a:t>10/29/24</a:t>
+              <a:t>11/7/2024</a:t>
             </a:fld>
             <a:endParaRPr lang="en-US"/>
           </a:p>
@@ -15945,7 +18948,7 @@
           <a:p>
             <a:fld id="{5DFC374B-5D3B-4E34-8375-9DADCE452C16}" type="datetimeFigureOut">
               <a:rPr lang="en-US" smtClean="0"/>
-              <a:t>10/29/24</a:t>
+              <a:t>11/7/2024</a:t>
             </a:fld>
             <a:endParaRPr lang="en-US"/>
           </a:p>
@@ -16291,7 +19294,7 @@
           <a:p>
             <a:fld id="{5DFC374B-5D3B-4E34-8375-9DADCE452C16}" type="datetimeFigureOut">
               <a:rPr lang="en-US" smtClean="0"/>
-              <a:t>10/29/24</a:t>
+              <a:t>11/7/2024</a:t>
             </a:fld>
             <a:endParaRPr lang="en-US"/>
           </a:p>
@@ -16679,7 +19682,7 @@
           <a:p>
             <a:fld id="{5DFC374B-5D3B-4E34-8375-9DADCE452C16}" type="datetimeFigureOut">
               <a:rPr lang="en-US" smtClean="0"/>
-              <a:t>10/29/24</a:t>
+              <a:t>11/7/2024</a:t>
             </a:fld>
             <a:endParaRPr lang="en-US"/>
           </a:p>
@@ -16957,7 +19960,7 @@
           <a:p>
             <a:fld id="{5DFC374B-5D3B-4E34-8375-9DADCE452C16}" type="datetimeFigureOut">
               <a:rPr lang="en-US" smtClean="0"/>
-              <a:t>10/29/24</a:t>
+              <a:t>11/7/2024</a:t>
             </a:fld>
             <a:endParaRPr lang="en-US"/>
           </a:p>
@@ -17673,6 +20676,114 @@
           <p:cNvPr id="2" name="Title 1">
             <a:extLst>
               <a:ext uri="{FF2B5EF4-FFF2-40B4-BE49-F238E27FC236}">
+                <a16:creationId xmlns:a16="http://schemas.microsoft.com/office/drawing/2014/main" id="{5285B055-FD87-29A6-656D-4FD203586144}"/>
+              </a:ext>
+            </a:extLst>
+          </p:cNvPr>
+          <p:cNvSpPr>
+            <a:spLocks noGrp="1"/>
+          </p:cNvSpPr>
+          <p:nvPr>
+            <p:ph type="title"/>
+          </p:nvPr>
+        </p:nvSpPr>
+        <p:spPr>
+          <a:xfrm>
+            <a:off x="1371600" y="685800"/>
+            <a:ext cx="9601200" cy="1485900"/>
+          </a:xfrm>
+        </p:spPr>
+        <p:txBody>
+          <a:bodyPr>
+            <a:normAutofit/>
+          </a:bodyPr>
+          <a:lstStyle/>
+          <a:p>
+            <a:r>
+              <a:rPr lang="en-US" sz="3400" dirty="0"/>
+              <a:t>The Terraform language uses the following types for its values:</a:t>
+            </a:r>
+            <a:br>
+              <a:rPr lang="en-US" sz="3400" dirty="0"/>
+            </a:br>
+            <a:endParaRPr lang="en-US" sz="3400" dirty="0"/>
+          </a:p>
+        </p:txBody>
+      </p:sp>
+      <p:graphicFrame>
+        <p:nvGraphicFramePr>
+          <p:cNvPr id="7" name="Content Placeholder 2">
+            <a:extLst>
+              <a:ext uri="{FF2B5EF4-FFF2-40B4-BE49-F238E27FC236}">
+                <a16:creationId xmlns:a16="http://schemas.microsoft.com/office/drawing/2014/main" id="{2FE948DD-7AD5-A9EF-054C-7E2602FBD113}"/>
+              </a:ext>
+            </a:extLst>
+          </p:cNvPr>
+          <p:cNvGraphicFramePr>
+            <a:graphicFrameLocks noGrp="1"/>
+          </p:cNvGraphicFramePr>
+          <p:nvPr>
+            <p:ph idx="1"/>
+            <p:extLst>
+              <p:ext uri="{D42A27DB-BD31-4B8C-83A1-F6EECF244321}">
+                <p14:modId xmlns:p14="http://schemas.microsoft.com/office/powerpoint/2010/main" val="272280440"/>
+              </p:ext>
+            </p:extLst>
+          </p:nvPr>
+        </p:nvGraphicFramePr>
+        <p:xfrm>
+          <a:off x="1371600" y="2286000"/>
+          <a:ext cx="9601200" cy="3581400"/>
+        </p:xfrm>
+        <a:graphic>
+          <a:graphicData uri="http://schemas.openxmlformats.org/drawingml/2006/diagram">
+            <dgm:relIds xmlns:dgm="http://schemas.openxmlformats.org/drawingml/2006/diagram" xmlns:r="http://schemas.openxmlformats.org/officeDocument/2006/relationships" r:dm="rId2" r:lo="rId3" r:qs="rId4" r:cs="rId5"/>
+          </a:graphicData>
+        </a:graphic>
+      </p:graphicFrame>
+    </p:spTree>
+    <p:extLst>
+      <p:ext uri="{BB962C8B-B14F-4D97-AF65-F5344CB8AC3E}">
+        <p14:creationId xmlns:p14="http://schemas.microsoft.com/office/powerpoint/2010/main" val="1100137186"/>
+      </p:ext>
+    </p:extLst>
+  </p:cSld>
+  <p:clrMapOvr>
+    <a:masterClrMapping/>
+  </p:clrMapOvr>
+</p:sld>
+</file>
+
+<file path=ppt/slides/slide4.xml><?xml version="1.0" encoding="utf-8"?>
+<p:sld xmlns:a="http://schemas.openxmlformats.org/drawingml/2006/main" xmlns:r="http://schemas.openxmlformats.org/officeDocument/2006/relationships" xmlns:p="http://schemas.openxmlformats.org/presentationml/2006/main">
+  <p:cSld>
+    <p:bg>
+      <p:bgPr>
+        <a:solidFill>
+          <a:schemeClr val="bg2"/>
+        </a:solidFill>
+        <a:effectLst/>
+      </p:bgPr>
+    </p:bg>
+    <p:spTree>
+      <p:nvGrpSpPr>
+        <p:cNvPr id="1" name=""/>
+        <p:cNvGrpSpPr/>
+        <p:nvPr/>
+      </p:nvGrpSpPr>
+      <p:grpSpPr>
+        <a:xfrm>
+          <a:off x="0" y="0"/>
+          <a:ext cx="0" cy="0"/>
+          <a:chOff x="0" y="0"/>
+          <a:chExt cx="0" cy="0"/>
+        </a:xfrm>
+      </p:grpSpPr>
+      <p:sp>
+        <p:nvSpPr>
+          <p:cNvPr id="2" name="Title 1">
+            <a:extLst>
+              <a:ext uri="{FF2B5EF4-FFF2-40B4-BE49-F238E27FC236}">
                 <a16:creationId xmlns:a16="http://schemas.microsoft.com/office/drawing/2014/main" id="{BF6946C1-4CC0-1D4F-B2BC-6E743DF15F71}"/>
               </a:ext>
             </a:extLst>
@@ -17747,7 +20858,7 @@
 </p:sld>
 </file>
 
-<file path=ppt/slides/slide4.xml><?xml version="1.0" encoding="utf-8"?>
+<file path=ppt/slides/slide5.xml><?xml version="1.0" encoding="utf-8"?>
 <p:sld xmlns:a="http://schemas.openxmlformats.org/drawingml/2006/main" xmlns:r="http://schemas.openxmlformats.org/officeDocument/2006/relationships" xmlns:p="http://schemas.openxmlformats.org/presentationml/2006/main">
   <p:cSld>
     <p:bg>
@@ -17912,7 +21023,7 @@
 </p:sld>
 </file>
 
-<file path=ppt/slides/slide5.xml><?xml version="1.0" encoding="utf-8"?>
+<file path=ppt/slides/slide6.xml><?xml version="1.0" encoding="utf-8"?>
 <p:sld xmlns:a="http://schemas.openxmlformats.org/drawingml/2006/main" xmlns:r="http://schemas.openxmlformats.org/officeDocument/2006/relationships" xmlns:p="http://schemas.openxmlformats.org/presentationml/2006/main">
   <p:cSld>
     <p:bg>
@@ -18050,7 +21161,7 @@
             <p:ph idx="1"/>
             <p:extLst>
               <p:ext uri="{D42A27DB-BD31-4B8C-83A1-F6EECF244321}">
-                <p14:modId xmlns:p14="http://schemas.microsoft.com/office/powerpoint/2010/main" val="826918630"/>
+                <p14:modId xmlns:p14="http://schemas.microsoft.com/office/powerpoint/2010/main" val="1207687681"/>
               </p:ext>
             </p:extLst>
           </p:nvPr>
@@ -18078,7 +21189,7 @@
 </p:sld>
 </file>
 
-<file path=ppt/slides/slide6.xml><?xml version="1.0" encoding="utf-8"?>
+<file path=ppt/slides/slide7.xml><?xml version="1.0" encoding="utf-8"?>
 <p:sld xmlns:a="http://schemas.openxmlformats.org/drawingml/2006/main" xmlns:r="http://schemas.openxmlformats.org/officeDocument/2006/relationships" xmlns:p="http://schemas.openxmlformats.org/presentationml/2006/main">
   <p:cSld>
     <p:bg>
@@ -18350,7 +21461,7 @@
 </p:sld>
 </file>
 
-<file path=ppt/slides/slide7.xml><?xml version="1.0" encoding="utf-8"?>
+<file path=ppt/slides/slide8.xml><?xml version="1.0" encoding="utf-8"?>
 <p:sld xmlns:a="http://schemas.openxmlformats.org/drawingml/2006/main" xmlns:r="http://schemas.openxmlformats.org/officeDocument/2006/relationships" xmlns:p="http://schemas.openxmlformats.org/presentationml/2006/main">
   <p:cSld>
     <p:bg>

</xml_diff>